<commit_message>
update Y10 NS pt2
</commit_message>
<xml_diff>
--- a/ALevel/BigO/BigOPresentation.pptx
+++ b/ALevel/BigO/BigOPresentation.pptx
@@ -5,7 +5,7 @@
     <p:sldMasterId id="2147483648" r:id="rId1"/>
   </p:sldMasterIdLst>
   <p:notesMasterIdLst>
-    <p:notesMasterId r:id="rId16"/>
+    <p:notesMasterId r:id="rId19"/>
   </p:notesMasterIdLst>
   <p:sldIdLst>
     <p:sldId id="256" r:id="rId2"/>
@@ -22,6 +22,9 @@
     <p:sldId id="295" r:id="rId13"/>
     <p:sldId id="300" r:id="rId14"/>
     <p:sldId id="297" r:id="rId15"/>
+    <p:sldId id="301" r:id="rId16"/>
+    <p:sldId id="302" r:id="rId17"/>
+    <p:sldId id="303" r:id="rId18"/>
   </p:sldIdLst>
   <p:sldSz cx="24384000" cy="13716000"/>
   <p:notesSz cx="9144000" cy="6858000"/>
@@ -703,6 +706,72 @@
     <p:extLst>
       <p:ext uri="{BB962C8B-B14F-4D97-AF65-F5344CB8AC3E}">
         <p14:creationId xmlns:p14="http://schemas.microsoft.com/office/powerpoint/2010/main" val="2533630688"/>
+      </p:ext>
+    </p:extLst>
+  </p:cSld>
+  <p:clrMapOvr>
+    <a:masterClrMapping/>
+  </p:clrMapOvr>
+</p:notes>
+</file>
+
+<file path=ppt/notesSlides/notesSlide12.xml><?xml version="1.0" encoding="utf-8"?>
+<p:notes xmlns:a="http://schemas.openxmlformats.org/drawingml/2006/main" xmlns:r="http://schemas.openxmlformats.org/officeDocument/2006/relationships" xmlns:p="http://schemas.openxmlformats.org/presentationml/2006/main">
+  <p:cSld>
+    <p:spTree>
+      <p:nvGrpSpPr>
+        <p:cNvPr id="1" name=""/>
+        <p:cNvGrpSpPr/>
+        <p:nvPr/>
+      </p:nvGrpSpPr>
+      <p:grpSpPr>
+        <a:xfrm>
+          <a:off x="0" y="0"/>
+          <a:ext cx="0" cy="0"/>
+          <a:chOff x="0" y="0"/>
+          <a:chExt cx="0" cy="0"/>
+        </a:xfrm>
+      </p:grpSpPr>
+      <p:sp>
+        <p:nvSpPr>
+          <p:cNvPr id="2" name="Slide Image Placeholder 1"/>
+          <p:cNvSpPr>
+            <a:spLocks noGrp="1" noRot="1" noChangeAspect="1"/>
+          </p:cNvSpPr>
+          <p:nvPr>
+            <p:ph type="sldImg"/>
+          </p:nvPr>
+        </p:nvSpPr>
+        <p:spPr>
+          <a:xfrm>
+            <a:off x="2286000" y="514350"/>
+            <a:ext cx="4572000" cy="2571750"/>
+          </a:xfrm>
+        </p:spPr>
+      </p:sp>
+      <p:sp>
+        <p:nvSpPr>
+          <p:cNvPr id="3" name="Notes Placeholder 2"/>
+          <p:cNvSpPr>
+            <a:spLocks noGrp="1"/>
+          </p:cNvSpPr>
+          <p:nvPr>
+            <p:ph type="body" idx="1"/>
+          </p:nvPr>
+        </p:nvSpPr>
+        <p:spPr/>
+        <p:txBody>
+          <a:bodyPr/>
+          <a:lstStyle/>
+          <a:p>
+            <a:endParaRPr lang="en-US"/>
+          </a:p>
+        </p:txBody>
+      </p:sp>
+    </p:spTree>
+    <p:extLst>
+      <p:ext uri="{BB962C8B-B14F-4D97-AF65-F5344CB8AC3E}">
+        <p14:creationId xmlns:p14="http://schemas.microsoft.com/office/powerpoint/2010/main" val="2318667046"/>
       </p:ext>
     </p:extLst>
   </p:cSld>
@@ -5943,6 +6012,3236 @@
     <p:extLst>
       <p:ext uri="{BB962C8B-B14F-4D97-AF65-F5344CB8AC3E}">
         <p14:creationId xmlns:p14="http://schemas.microsoft.com/office/powerpoint/2010/main" val="404904139"/>
+      </p:ext>
+    </p:extLst>
+  </p:cSld>
+  <p:clrMapOvr>
+    <a:masterClrMapping/>
+  </p:clrMapOvr>
+  <p:transition spd="med"/>
+</p:sld>
+</file>
+
+<file path=ppt/slides/slide15.xml><?xml version="1.0" encoding="utf-8"?>
+<p:sld xmlns:a="http://schemas.openxmlformats.org/drawingml/2006/main" xmlns:r="http://schemas.openxmlformats.org/officeDocument/2006/relationships" xmlns:p="http://schemas.openxmlformats.org/presentationml/2006/main">
+  <p:cSld>
+    <p:spTree>
+      <p:nvGrpSpPr>
+        <p:cNvPr id="1" name=""/>
+        <p:cNvGrpSpPr/>
+        <p:nvPr/>
+      </p:nvGrpSpPr>
+      <p:grpSpPr>
+        <a:xfrm>
+          <a:off x="0" y="0"/>
+          <a:ext cx="0" cy="0"/>
+          <a:chOff x="0" y="0"/>
+          <a:chExt cx="0" cy="0"/>
+        </a:xfrm>
+      </p:grpSpPr>
+      <p:sp>
+        <p:nvSpPr>
+          <p:cNvPr id="2" name="Title 1">
+            <a:extLst>
+              <a:ext uri="{FF2B5EF4-FFF2-40B4-BE49-F238E27FC236}">
+                <a16:creationId xmlns:a16="http://schemas.microsoft.com/office/drawing/2014/main" id="{F07F01EB-C098-3D09-F816-61D885652193}"/>
+              </a:ext>
+            </a:extLst>
+          </p:cNvPr>
+          <p:cNvSpPr>
+            <a:spLocks noGrp="1"/>
+          </p:cNvSpPr>
+          <p:nvPr>
+            <p:ph type="title"/>
+          </p:nvPr>
+        </p:nvSpPr>
+        <p:spPr/>
+        <p:txBody>
+          <a:bodyPr/>
+          <a:lstStyle/>
+          <a:p>
+            <a:r>
+              <a:rPr lang="en-US" b="1" dirty="0"/>
+              <a:t>Tractable vs intractable</a:t>
+            </a:r>
+          </a:p>
+        </p:txBody>
+      </p:sp>
+      <p:sp>
+        <p:nvSpPr>
+          <p:cNvPr id="6" name="Text Placeholder 3">
+            <a:extLst>
+              <a:ext uri="{FF2B5EF4-FFF2-40B4-BE49-F238E27FC236}">
+                <a16:creationId xmlns:a16="http://schemas.microsoft.com/office/drawing/2014/main" id="{EC249A1F-0407-FDC3-72C6-D3396FE0D0CE}"/>
+              </a:ext>
+            </a:extLst>
+          </p:cNvPr>
+          <p:cNvSpPr>
+            <a:spLocks noGrp="1"/>
+          </p:cNvSpPr>
+          <p:nvPr>
+            <p:ph type="body" idx="1"/>
+          </p:nvPr>
+        </p:nvSpPr>
+        <p:spPr>
+          <a:xfrm>
+            <a:off x="518827" y="4974355"/>
+            <a:ext cx="2992582" cy="4141929"/>
+          </a:xfrm>
+        </p:spPr>
+        <p:txBody>
+          <a:bodyPr>
+            <a:normAutofit fontScale="92500" lnSpcReduction="10000"/>
+          </a:bodyPr>
+          <a:lstStyle/>
+          <a:p>
+            <a:pPr algn="ctr"/>
+            <a:r>
+              <a:rPr lang="en-US" dirty="0"/>
+              <a:t>Constant</a:t>
+            </a:r>
+          </a:p>
+          <a:p>
+            <a:pPr algn="ctr"/>
+            <a:r>
+              <a:rPr lang="en-US" dirty="0"/>
+              <a:t>y=1</a:t>
+            </a:r>
+          </a:p>
+          <a:p>
+            <a:pPr algn="ctr"/>
+            <a:endParaRPr lang="en-US" dirty="0"/>
+          </a:p>
+          <a:p>
+            <a:pPr algn="ctr"/>
+            <a:r>
+              <a:rPr lang="en-US" dirty="0"/>
+              <a:t>O(n)</a:t>
+            </a:r>
+          </a:p>
+        </p:txBody>
+      </p:sp>
+      <p:sp>
+        <p:nvSpPr>
+          <p:cNvPr id="7" name="Text Placeholder 3">
+            <a:extLst>
+              <a:ext uri="{FF2B5EF4-FFF2-40B4-BE49-F238E27FC236}">
+                <a16:creationId xmlns:a16="http://schemas.microsoft.com/office/drawing/2014/main" id="{30CC9B82-8D02-F532-9E6D-1DD96C0A6479}"/>
+              </a:ext>
+            </a:extLst>
+          </p:cNvPr>
+          <p:cNvSpPr txBox="1">
+            <a:spLocks/>
+          </p:cNvSpPr>
+          <p:nvPr/>
+        </p:nvSpPr>
+        <p:spPr>
+          <a:xfrm>
+            <a:off x="6814131" y="4974355"/>
+            <a:ext cx="2992582" cy="4141929"/>
+          </a:xfrm>
+          <a:prstGeom prst="rect">
+            <a:avLst/>
+          </a:prstGeom>
+          <a:ln w="12700">
+            <a:miter lim="400000"/>
+          </a:ln>
+          <a:extLst>
+            <a:ext uri="{C572A759-6A51-4108-AA02-DFA0A04FC94B}">
+              <ma14:wrappingTextBoxFlag xmlns="" xmlns:m="http://schemas.openxmlformats.org/officeDocument/2006/math" xmlns:a14="http://schemas.microsoft.com/office/drawing/2010/main" xmlns:ma14="http://schemas.microsoft.com/office/mac/drawingml/2011/main" val="1"/>
+            </a:ext>
+          </a:extLst>
+        </p:spPr>
+        <p:txBody>
+          <a:bodyPr lIns="50800" tIns="50800" rIns="50800" bIns="50800">
+            <a:normAutofit fontScale="92500" lnSpcReduction="10000"/>
+          </a:bodyPr>
+          <a:lstStyle>
+            <a:lvl1pPr marL="0" marR="0" indent="0" algn="l" defTabSz="825500" rtl="0" latinLnBrk="0">
+              <a:lnSpc>
+                <a:spcPct val="140000"/>
+              </a:lnSpc>
+              <a:spcBef>
+                <a:spcPts val="0"/>
+              </a:spcBef>
+              <a:spcAft>
+                <a:spcPts val="0"/>
+              </a:spcAft>
+              <a:buClrTx/>
+              <a:buSzTx/>
+              <a:buFontTx/>
+              <a:buNone/>
+              <a:tabLst/>
+              <a:defRPr sz="5400" b="1" i="0" u="none" strike="noStrike" cap="none" spc="-53" baseline="0">
+                <a:solidFill>
+                  <a:srgbClr val="000000"/>
+                </a:solidFill>
+                <a:uFillTx/>
+                <a:latin typeface="Proxima Nova"/>
+                <a:ea typeface="Proxima Nova"/>
+                <a:cs typeface="Proxima Nova"/>
+                <a:sym typeface="Proxima Nova"/>
+              </a:defRPr>
+            </a:lvl1pPr>
+            <a:lvl2pPr marL="0" marR="0" indent="457200" algn="l" defTabSz="825500" rtl="0" latinLnBrk="0">
+              <a:lnSpc>
+                <a:spcPct val="140000"/>
+              </a:lnSpc>
+              <a:spcBef>
+                <a:spcPts val="0"/>
+              </a:spcBef>
+              <a:spcAft>
+                <a:spcPts val="0"/>
+              </a:spcAft>
+              <a:buClrTx/>
+              <a:buSzTx/>
+              <a:buFontTx/>
+              <a:buNone/>
+              <a:tabLst/>
+              <a:defRPr sz="5400" b="1" i="0" u="none" strike="noStrike" cap="none" spc="-53" baseline="0">
+                <a:solidFill>
+                  <a:srgbClr val="000000"/>
+                </a:solidFill>
+                <a:uFillTx/>
+                <a:latin typeface="Proxima Nova"/>
+                <a:ea typeface="Proxima Nova"/>
+                <a:cs typeface="Proxima Nova"/>
+                <a:sym typeface="Proxima Nova"/>
+              </a:defRPr>
+            </a:lvl2pPr>
+            <a:lvl3pPr marL="0" marR="0" indent="914400" algn="l" defTabSz="825500" rtl="0" latinLnBrk="0">
+              <a:lnSpc>
+                <a:spcPct val="140000"/>
+              </a:lnSpc>
+              <a:spcBef>
+                <a:spcPts val="0"/>
+              </a:spcBef>
+              <a:spcAft>
+                <a:spcPts val="0"/>
+              </a:spcAft>
+              <a:buClrTx/>
+              <a:buSzTx/>
+              <a:buFontTx/>
+              <a:buNone/>
+              <a:tabLst/>
+              <a:defRPr sz="5400" b="1" i="0" u="none" strike="noStrike" cap="none" spc="-53" baseline="0">
+                <a:solidFill>
+                  <a:srgbClr val="000000"/>
+                </a:solidFill>
+                <a:uFillTx/>
+                <a:latin typeface="Proxima Nova"/>
+                <a:ea typeface="Proxima Nova"/>
+                <a:cs typeface="Proxima Nova"/>
+                <a:sym typeface="Proxima Nova"/>
+              </a:defRPr>
+            </a:lvl3pPr>
+            <a:lvl4pPr marL="0" marR="0" indent="1371600" algn="l" defTabSz="825500" rtl="0" latinLnBrk="0">
+              <a:lnSpc>
+                <a:spcPct val="140000"/>
+              </a:lnSpc>
+              <a:spcBef>
+                <a:spcPts val="0"/>
+              </a:spcBef>
+              <a:spcAft>
+                <a:spcPts val="0"/>
+              </a:spcAft>
+              <a:buClrTx/>
+              <a:buSzTx/>
+              <a:buFontTx/>
+              <a:buNone/>
+              <a:tabLst/>
+              <a:defRPr sz="5400" b="1" i="0" u="none" strike="noStrike" cap="none" spc="-53" baseline="0">
+                <a:solidFill>
+                  <a:srgbClr val="000000"/>
+                </a:solidFill>
+                <a:uFillTx/>
+                <a:latin typeface="Proxima Nova"/>
+                <a:ea typeface="Proxima Nova"/>
+                <a:cs typeface="Proxima Nova"/>
+                <a:sym typeface="Proxima Nova"/>
+              </a:defRPr>
+            </a:lvl4pPr>
+            <a:lvl5pPr marL="0" marR="0" indent="1828800" algn="l" defTabSz="825500" rtl="0" latinLnBrk="0">
+              <a:lnSpc>
+                <a:spcPct val="140000"/>
+              </a:lnSpc>
+              <a:spcBef>
+                <a:spcPts val="0"/>
+              </a:spcBef>
+              <a:spcAft>
+                <a:spcPts val="0"/>
+              </a:spcAft>
+              <a:buClrTx/>
+              <a:buSzTx/>
+              <a:buFontTx/>
+              <a:buNone/>
+              <a:tabLst/>
+              <a:defRPr sz="5400" b="1" i="0" u="none" strike="noStrike" cap="none" spc="-53" baseline="0">
+                <a:solidFill>
+                  <a:srgbClr val="000000"/>
+                </a:solidFill>
+                <a:uFillTx/>
+                <a:latin typeface="Proxima Nova"/>
+                <a:ea typeface="Proxima Nova"/>
+                <a:cs typeface="Proxima Nova"/>
+                <a:sym typeface="Proxima Nova"/>
+              </a:defRPr>
+            </a:lvl5pPr>
+            <a:lvl6pPr marL="4114800" marR="0" indent="-685800" algn="l" defTabSz="584200" rtl="0" latinLnBrk="0">
+              <a:lnSpc>
+                <a:spcPct val="80000"/>
+              </a:lnSpc>
+              <a:spcBef>
+                <a:spcPts val="2400"/>
+              </a:spcBef>
+              <a:spcAft>
+                <a:spcPts val="0"/>
+              </a:spcAft>
+              <a:buClr>
+                <a:srgbClr val="57BEF0"/>
+              </a:buClr>
+              <a:buSzPct val="250000"/>
+              <a:buFontTx/>
+              <a:buChar char="-"/>
+              <a:tabLst/>
+              <a:defRPr sz="4200" b="1" i="0" u="none" strike="noStrike" cap="none" spc="0" baseline="0">
+                <a:solidFill>
+                  <a:srgbClr val="53585F"/>
+                </a:solidFill>
+                <a:uFillTx/>
+                <a:latin typeface="Proxima Nova"/>
+                <a:ea typeface="Proxima Nova"/>
+                <a:cs typeface="Proxima Nova"/>
+                <a:sym typeface="Proxima Nova"/>
+              </a:defRPr>
+            </a:lvl6pPr>
+            <a:lvl7pPr marL="4800600" marR="0" indent="-685800" algn="l" defTabSz="584200" rtl="0" latinLnBrk="0">
+              <a:lnSpc>
+                <a:spcPct val="80000"/>
+              </a:lnSpc>
+              <a:spcBef>
+                <a:spcPts val="2400"/>
+              </a:spcBef>
+              <a:spcAft>
+                <a:spcPts val="0"/>
+              </a:spcAft>
+              <a:buClr>
+                <a:srgbClr val="57BEF0"/>
+              </a:buClr>
+              <a:buSzPct val="250000"/>
+              <a:buFontTx/>
+              <a:buChar char="-"/>
+              <a:tabLst/>
+              <a:defRPr sz="4200" b="1" i="0" u="none" strike="noStrike" cap="none" spc="0" baseline="0">
+                <a:solidFill>
+                  <a:srgbClr val="53585F"/>
+                </a:solidFill>
+                <a:uFillTx/>
+                <a:latin typeface="Proxima Nova"/>
+                <a:ea typeface="Proxima Nova"/>
+                <a:cs typeface="Proxima Nova"/>
+                <a:sym typeface="Proxima Nova"/>
+              </a:defRPr>
+            </a:lvl7pPr>
+            <a:lvl8pPr marL="5486400" marR="0" indent="-685800" algn="l" defTabSz="584200" rtl="0" latinLnBrk="0">
+              <a:lnSpc>
+                <a:spcPct val="80000"/>
+              </a:lnSpc>
+              <a:spcBef>
+                <a:spcPts val="2400"/>
+              </a:spcBef>
+              <a:spcAft>
+                <a:spcPts val="0"/>
+              </a:spcAft>
+              <a:buClr>
+                <a:srgbClr val="57BEF0"/>
+              </a:buClr>
+              <a:buSzPct val="250000"/>
+              <a:buFontTx/>
+              <a:buChar char="-"/>
+              <a:tabLst/>
+              <a:defRPr sz="4200" b="1" i="0" u="none" strike="noStrike" cap="none" spc="0" baseline="0">
+                <a:solidFill>
+                  <a:srgbClr val="53585F"/>
+                </a:solidFill>
+                <a:uFillTx/>
+                <a:latin typeface="Proxima Nova"/>
+                <a:ea typeface="Proxima Nova"/>
+                <a:cs typeface="Proxima Nova"/>
+                <a:sym typeface="Proxima Nova"/>
+              </a:defRPr>
+            </a:lvl8pPr>
+            <a:lvl9pPr marL="6172200" marR="0" indent="-685800" algn="l" defTabSz="584200" rtl="0" latinLnBrk="0">
+              <a:lnSpc>
+                <a:spcPct val="80000"/>
+              </a:lnSpc>
+              <a:spcBef>
+                <a:spcPts val="2400"/>
+              </a:spcBef>
+              <a:spcAft>
+                <a:spcPts val="0"/>
+              </a:spcAft>
+              <a:buClr>
+                <a:srgbClr val="57BEF0"/>
+              </a:buClr>
+              <a:buSzPct val="250000"/>
+              <a:buFontTx/>
+              <a:buChar char="-"/>
+              <a:tabLst/>
+              <a:defRPr sz="4200" b="1" i="0" u="none" strike="noStrike" cap="none" spc="0" baseline="0">
+                <a:solidFill>
+                  <a:srgbClr val="53585F"/>
+                </a:solidFill>
+                <a:uFillTx/>
+                <a:latin typeface="Proxima Nova"/>
+                <a:ea typeface="Proxima Nova"/>
+                <a:cs typeface="Proxima Nova"/>
+                <a:sym typeface="Proxima Nova"/>
+              </a:defRPr>
+            </a:lvl9pPr>
+          </a:lstStyle>
+          <a:p>
+            <a:pPr algn="ctr" hangingPunct="1"/>
+            <a:r>
+              <a:rPr lang="en-US" dirty="0"/>
+              <a:t>Linear</a:t>
+            </a:r>
+          </a:p>
+          <a:p>
+            <a:pPr algn="ctr" hangingPunct="1"/>
+            <a:r>
+              <a:rPr lang="en-US" dirty="0"/>
+              <a:t>y=x</a:t>
+            </a:r>
+          </a:p>
+          <a:p>
+            <a:pPr algn="ctr" hangingPunct="1"/>
+            <a:endParaRPr lang="en-US" dirty="0"/>
+          </a:p>
+          <a:p>
+            <a:pPr algn="ctr" hangingPunct="1"/>
+            <a:r>
+              <a:rPr lang="en-US" dirty="0"/>
+              <a:t>O(n)</a:t>
+            </a:r>
+          </a:p>
+        </p:txBody>
+      </p:sp>
+      <p:sp>
+        <p:nvSpPr>
+          <p:cNvPr id="8" name="Text Placeholder 3">
+            <a:extLst>
+              <a:ext uri="{FF2B5EF4-FFF2-40B4-BE49-F238E27FC236}">
+                <a16:creationId xmlns:a16="http://schemas.microsoft.com/office/drawing/2014/main" id="{DF7156E2-1EB0-F237-C752-5B3F79AE3A3D}"/>
+              </a:ext>
+            </a:extLst>
+          </p:cNvPr>
+          <p:cNvSpPr txBox="1">
+            <a:spLocks/>
+          </p:cNvSpPr>
+          <p:nvPr/>
+        </p:nvSpPr>
+        <p:spPr>
+          <a:xfrm>
+            <a:off x="3334182" y="4974356"/>
+            <a:ext cx="4008005" cy="4141928"/>
+          </a:xfrm>
+          <a:prstGeom prst="rect">
+            <a:avLst/>
+          </a:prstGeom>
+          <a:ln w="12700">
+            <a:miter lim="400000"/>
+          </a:ln>
+          <a:extLst>
+            <a:ext uri="{C572A759-6A51-4108-AA02-DFA0A04FC94B}">
+              <ma14:wrappingTextBoxFlag xmlns="" xmlns:m="http://schemas.openxmlformats.org/officeDocument/2006/math" xmlns:a14="http://schemas.microsoft.com/office/drawing/2010/main" xmlns:ma14="http://schemas.microsoft.com/office/mac/drawingml/2011/main" val="1"/>
+            </a:ext>
+          </a:extLst>
+        </p:spPr>
+        <p:txBody>
+          <a:bodyPr lIns="50800" tIns="50800" rIns="50800" bIns="50800">
+            <a:normAutofit fontScale="92500" lnSpcReduction="10000"/>
+          </a:bodyPr>
+          <a:lstStyle>
+            <a:lvl1pPr marL="0" marR="0" indent="0" algn="l" defTabSz="825500" rtl="0" latinLnBrk="0">
+              <a:lnSpc>
+                <a:spcPct val="140000"/>
+              </a:lnSpc>
+              <a:spcBef>
+                <a:spcPts val="0"/>
+              </a:spcBef>
+              <a:spcAft>
+                <a:spcPts val="0"/>
+              </a:spcAft>
+              <a:buClrTx/>
+              <a:buSzTx/>
+              <a:buFontTx/>
+              <a:buNone/>
+              <a:tabLst/>
+              <a:defRPr sz="5400" b="1" i="0" u="none" strike="noStrike" cap="none" spc="-53" baseline="0">
+                <a:solidFill>
+                  <a:srgbClr val="000000"/>
+                </a:solidFill>
+                <a:uFillTx/>
+                <a:latin typeface="Proxima Nova"/>
+                <a:ea typeface="Proxima Nova"/>
+                <a:cs typeface="Proxima Nova"/>
+                <a:sym typeface="Proxima Nova"/>
+              </a:defRPr>
+            </a:lvl1pPr>
+            <a:lvl2pPr marL="0" marR="0" indent="457200" algn="l" defTabSz="825500" rtl="0" latinLnBrk="0">
+              <a:lnSpc>
+                <a:spcPct val="140000"/>
+              </a:lnSpc>
+              <a:spcBef>
+                <a:spcPts val="0"/>
+              </a:spcBef>
+              <a:spcAft>
+                <a:spcPts val="0"/>
+              </a:spcAft>
+              <a:buClrTx/>
+              <a:buSzTx/>
+              <a:buFontTx/>
+              <a:buNone/>
+              <a:tabLst/>
+              <a:defRPr sz="5400" b="1" i="0" u="none" strike="noStrike" cap="none" spc="-53" baseline="0">
+                <a:solidFill>
+                  <a:srgbClr val="000000"/>
+                </a:solidFill>
+                <a:uFillTx/>
+                <a:latin typeface="Proxima Nova"/>
+                <a:ea typeface="Proxima Nova"/>
+                <a:cs typeface="Proxima Nova"/>
+                <a:sym typeface="Proxima Nova"/>
+              </a:defRPr>
+            </a:lvl2pPr>
+            <a:lvl3pPr marL="0" marR="0" indent="914400" algn="l" defTabSz="825500" rtl="0" latinLnBrk="0">
+              <a:lnSpc>
+                <a:spcPct val="140000"/>
+              </a:lnSpc>
+              <a:spcBef>
+                <a:spcPts val="0"/>
+              </a:spcBef>
+              <a:spcAft>
+                <a:spcPts val="0"/>
+              </a:spcAft>
+              <a:buClrTx/>
+              <a:buSzTx/>
+              <a:buFontTx/>
+              <a:buNone/>
+              <a:tabLst/>
+              <a:defRPr sz="5400" b="1" i="0" u="none" strike="noStrike" cap="none" spc="-53" baseline="0">
+                <a:solidFill>
+                  <a:srgbClr val="000000"/>
+                </a:solidFill>
+                <a:uFillTx/>
+                <a:latin typeface="Proxima Nova"/>
+                <a:ea typeface="Proxima Nova"/>
+                <a:cs typeface="Proxima Nova"/>
+                <a:sym typeface="Proxima Nova"/>
+              </a:defRPr>
+            </a:lvl3pPr>
+            <a:lvl4pPr marL="0" marR="0" indent="1371600" algn="l" defTabSz="825500" rtl="0" latinLnBrk="0">
+              <a:lnSpc>
+                <a:spcPct val="140000"/>
+              </a:lnSpc>
+              <a:spcBef>
+                <a:spcPts val="0"/>
+              </a:spcBef>
+              <a:spcAft>
+                <a:spcPts val="0"/>
+              </a:spcAft>
+              <a:buClrTx/>
+              <a:buSzTx/>
+              <a:buFontTx/>
+              <a:buNone/>
+              <a:tabLst/>
+              <a:defRPr sz="5400" b="1" i="0" u="none" strike="noStrike" cap="none" spc="-53" baseline="0">
+                <a:solidFill>
+                  <a:srgbClr val="000000"/>
+                </a:solidFill>
+                <a:uFillTx/>
+                <a:latin typeface="Proxima Nova"/>
+                <a:ea typeface="Proxima Nova"/>
+                <a:cs typeface="Proxima Nova"/>
+                <a:sym typeface="Proxima Nova"/>
+              </a:defRPr>
+            </a:lvl4pPr>
+            <a:lvl5pPr marL="0" marR="0" indent="1828800" algn="l" defTabSz="825500" rtl="0" latinLnBrk="0">
+              <a:lnSpc>
+                <a:spcPct val="140000"/>
+              </a:lnSpc>
+              <a:spcBef>
+                <a:spcPts val="0"/>
+              </a:spcBef>
+              <a:spcAft>
+                <a:spcPts val="0"/>
+              </a:spcAft>
+              <a:buClrTx/>
+              <a:buSzTx/>
+              <a:buFontTx/>
+              <a:buNone/>
+              <a:tabLst/>
+              <a:defRPr sz="5400" b="1" i="0" u="none" strike="noStrike" cap="none" spc="-53" baseline="0">
+                <a:solidFill>
+                  <a:srgbClr val="000000"/>
+                </a:solidFill>
+                <a:uFillTx/>
+                <a:latin typeface="Proxima Nova"/>
+                <a:ea typeface="Proxima Nova"/>
+                <a:cs typeface="Proxima Nova"/>
+                <a:sym typeface="Proxima Nova"/>
+              </a:defRPr>
+            </a:lvl5pPr>
+            <a:lvl6pPr marL="4114800" marR="0" indent="-685800" algn="l" defTabSz="584200" rtl="0" latinLnBrk="0">
+              <a:lnSpc>
+                <a:spcPct val="80000"/>
+              </a:lnSpc>
+              <a:spcBef>
+                <a:spcPts val="2400"/>
+              </a:spcBef>
+              <a:spcAft>
+                <a:spcPts val="0"/>
+              </a:spcAft>
+              <a:buClr>
+                <a:srgbClr val="57BEF0"/>
+              </a:buClr>
+              <a:buSzPct val="250000"/>
+              <a:buFontTx/>
+              <a:buChar char="-"/>
+              <a:tabLst/>
+              <a:defRPr sz="4200" b="1" i="0" u="none" strike="noStrike" cap="none" spc="0" baseline="0">
+                <a:solidFill>
+                  <a:srgbClr val="53585F"/>
+                </a:solidFill>
+                <a:uFillTx/>
+                <a:latin typeface="Proxima Nova"/>
+                <a:ea typeface="Proxima Nova"/>
+                <a:cs typeface="Proxima Nova"/>
+                <a:sym typeface="Proxima Nova"/>
+              </a:defRPr>
+            </a:lvl6pPr>
+            <a:lvl7pPr marL="4800600" marR="0" indent="-685800" algn="l" defTabSz="584200" rtl="0" latinLnBrk="0">
+              <a:lnSpc>
+                <a:spcPct val="80000"/>
+              </a:lnSpc>
+              <a:spcBef>
+                <a:spcPts val="2400"/>
+              </a:spcBef>
+              <a:spcAft>
+                <a:spcPts val="0"/>
+              </a:spcAft>
+              <a:buClr>
+                <a:srgbClr val="57BEF0"/>
+              </a:buClr>
+              <a:buSzPct val="250000"/>
+              <a:buFontTx/>
+              <a:buChar char="-"/>
+              <a:tabLst/>
+              <a:defRPr sz="4200" b="1" i="0" u="none" strike="noStrike" cap="none" spc="0" baseline="0">
+                <a:solidFill>
+                  <a:srgbClr val="53585F"/>
+                </a:solidFill>
+                <a:uFillTx/>
+                <a:latin typeface="Proxima Nova"/>
+                <a:ea typeface="Proxima Nova"/>
+                <a:cs typeface="Proxima Nova"/>
+                <a:sym typeface="Proxima Nova"/>
+              </a:defRPr>
+            </a:lvl7pPr>
+            <a:lvl8pPr marL="5486400" marR="0" indent="-685800" algn="l" defTabSz="584200" rtl="0" latinLnBrk="0">
+              <a:lnSpc>
+                <a:spcPct val="80000"/>
+              </a:lnSpc>
+              <a:spcBef>
+                <a:spcPts val="2400"/>
+              </a:spcBef>
+              <a:spcAft>
+                <a:spcPts val="0"/>
+              </a:spcAft>
+              <a:buClr>
+                <a:srgbClr val="57BEF0"/>
+              </a:buClr>
+              <a:buSzPct val="250000"/>
+              <a:buFontTx/>
+              <a:buChar char="-"/>
+              <a:tabLst/>
+              <a:defRPr sz="4200" b="1" i="0" u="none" strike="noStrike" cap="none" spc="0" baseline="0">
+                <a:solidFill>
+                  <a:srgbClr val="53585F"/>
+                </a:solidFill>
+                <a:uFillTx/>
+                <a:latin typeface="Proxima Nova"/>
+                <a:ea typeface="Proxima Nova"/>
+                <a:cs typeface="Proxima Nova"/>
+                <a:sym typeface="Proxima Nova"/>
+              </a:defRPr>
+            </a:lvl8pPr>
+            <a:lvl9pPr marL="6172200" marR="0" indent="-685800" algn="l" defTabSz="584200" rtl="0" latinLnBrk="0">
+              <a:lnSpc>
+                <a:spcPct val="80000"/>
+              </a:lnSpc>
+              <a:spcBef>
+                <a:spcPts val="2400"/>
+              </a:spcBef>
+              <a:spcAft>
+                <a:spcPts val="0"/>
+              </a:spcAft>
+              <a:buClr>
+                <a:srgbClr val="57BEF0"/>
+              </a:buClr>
+              <a:buSzPct val="250000"/>
+              <a:buFontTx/>
+              <a:buChar char="-"/>
+              <a:tabLst/>
+              <a:defRPr sz="4200" b="1" i="0" u="none" strike="noStrike" cap="none" spc="0" baseline="0">
+                <a:solidFill>
+                  <a:srgbClr val="53585F"/>
+                </a:solidFill>
+                <a:uFillTx/>
+                <a:latin typeface="Proxima Nova"/>
+                <a:ea typeface="Proxima Nova"/>
+                <a:cs typeface="Proxima Nova"/>
+                <a:sym typeface="Proxima Nova"/>
+              </a:defRPr>
+            </a:lvl9pPr>
+          </a:lstStyle>
+          <a:p>
+            <a:pPr algn="ctr" hangingPunct="1"/>
+            <a:r>
+              <a:rPr lang="en-US" dirty="0"/>
+              <a:t>Logarithmic</a:t>
+            </a:r>
+          </a:p>
+          <a:p>
+            <a:pPr algn="ctr" hangingPunct="1"/>
+            <a:r>
+              <a:rPr lang="en-US" dirty="0"/>
+              <a:t>y=log(x)</a:t>
+            </a:r>
+          </a:p>
+          <a:p>
+            <a:pPr algn="ctr" hangingPunct="1"/>
+            <a:endParaRPr lang="en-US" dirty="0"/>
+          </a:p>
+          <a:p>
+            <a:pPr algn="ctr" hangingPunct="1"/>
+            <a:r>
+              <a:rPr lang="en-US" dirty="0"/>
+              <a:t>O(log</a:t>
+            </a:r>
+            <a:r>
+              <a:rPr lang="en-US" baseline="-25000" dirty="0"/>
+              <a:t>2</a:t>
+            </a:r>
+            <a:r>
+              <a:rPr lang="en-US" dirty="0"/>
+              <a:t>(n))</a:t>
+            </a:r>
+          </a:p>
+        </p:txBody>
+      </p:sp>
+      <p:sp>
+        <p:nvSpPr>
+          <p:cNvPr id="9" name="Text Placeholder 3">
+            <a:extLst>
+              <a:ext uri="{FF2B5EF4-FFF2-40B4-BE49-F238E27FC236}">
+                <a16:creationId xmlns:a16="http://schemas.microsoft.com/office/drawing/2014/main" id="{22474F2B-C5FC-5381-0379-9FEDE4BDE8AE}"/>
+              </a:ext>
+            </a:extLst>
+          </p:cNvPr>
+          <p:cNvSpPr txBox="1">
+            <a:spLocks/>
+          </p:cNvSpPr>
+          <p:nvPr/>
+        </p:nvSpPr>
+        <p:spPr>
+          <a:xfrm>
+            <a:off x="12573286" y="4988787"/>
+            <a:ext cx="4008005" cy="4169635"/>
+          </a:xfrm>
+          <a:prstGeom prst="rect">
+            <a:avLst/>
+          </a:prstGeom>
+          <a:ln w="12700">
+            <a:miter lim="400000"/>
+          </a:ln>
+          <a:extLst>
+            <a:ext uri="{C572A759-6A51-4108-AA02-DFA0A04FC94B}">
+              <ma14:wrappingTextBoxFlag xmlns="" xmlns:m="http://schemas.openxmlformats.org/officeDocument/2006/math" xmlns:a14="http://schemas.microsoft.com/office/drawing/2010/main" xmlns:ma14="http://schemas.microsoft.com/office/mac/drawingml/2011/main" val="1"/>
+            </a:ext>
+          </a:extLst>
+        </p:spPr>
+        <p:txBody>
+          <a:bodyPr lIns="50800" tIns="50800" rIns="50800" bIns="50800">
+            <a:normAutofit lnSpcReduction="10000"/>
+          </a:bodyPr>
+          <a:lstStyle>
+            <a:lvl1pPr marL="0" marR="0" indent="0" algn="l" defTabSz="825500" rtl="0" latinLnBrk="0">
+              <a:lnSpc>
+                <a:spcPct val="140000"/>
+              </a:lnSpc>
+              <a:spcBef>
+                <a:spcPts val="0"/>
+              </a:spcBef>
+              <a:spcAft>
+                <a:spcPts val="0"/>
+              </a:spcAft>
+              <a:buClrTx/>
+              <a:buSzTx/>
+              <a:buFontTx/>
+              <a:buNone/>
+              <a:tabLst/>
+              <a:defRPr sz="5400" b="1" i="0" u="none" strike="noStrike" cap="none" spc="-53" baseline="0">
+                <a:solidFill>
+                  <a:srgbClr val="000000"/>
+                </a:solidFill>
+                <a:uFillTx/>
+                <a:latin typeface="Proxima Nova"/>
+                <a:ea typeface="Proxima Nova"/>
+                <a:cs typeface="Proxima Nova"/>
+                <a:sym typeface="Proxima Nova"/>
+              </a:defRPr>
+            </a:lvl1pPr>
+            <a:lvl2pPr marL="0" marR="0" indent="457200" algn="l" defTabSz="825500" rtl="0" latinLnBrk="0">
+              <a:lnSpc>
+                <a:spcPct val="140000"/>
+              </a:lnSpc>
+              <a:spcBef>
+                <a:spcPts val="0"/>
+              </a:spcBef>
+              <a:spcAft>
+                <a:spcPts val="0"/>
+              </a:spcAft>
+              <a:buClrTx/>
+              <a:buSzTx/>
+              <a:buFontTx/>
+              <a:buNone/>
+              <a:tabLst/>
+              <a:defRPr sz="5400" b="1" i="0" u="none" strike="noStrike" cap="none" spc="-53" baseline="0">
+                <a:solidFill>
+                  <a:srgbClr val="000000"/>
+                </a:solidFill>
+                <a:uFillTx/>
+                <a:latin typeface="Proxima Nova"/>
+                <a:ea typeface="Proxima Nova"/>
+                <a:cs typeface="Proxima Nova"/>
+                <a:sym typeface="Proxima Nova"/>
+              </a:defRPr>
+            </a:lvl2pPr>
+            <a:lvl3pPr marL="0" marR="0" indent="914400" algn="l" defTabSz="825500" rtl="0" latinLnBrk="0">
+              <a:lnSpc>
+                <a:spcPct val="140000"/>
+              </a:lnSpc>
+              <a:spcBef>
+                <a:spcPts val="0"/>
+              </a:spcBef>
+              <a:spcAft>
+                <a:spcPts val="0"/>
+              </a:spcAft>
+              <a:buClrTx/>
+              <a:buSzTx/>
+              <a:buFontTx/>
+              <a:buNone/>
+              <a:tabLst/>
+              <a:defRPr sz="5400" b="1" i="0" u="none" strike="noStrike" cap="none" spc="-53" baseline="0">
+                <a:solidFill>
+                  <a:srgbClr val="000000"/>
+                </a:solidFill>
+                <a:uFillTx/>
+                <a:latin typeface="Proxima Nova"/>
+                <a:ea typeface="Proxima Nova"/>
+                <a:cs typeface="Proxima Nova"/>
+                <a:sym typeface="Proxima Nova"/>
+              </a:defRPr>
+            </a:lvl3pPr>
+            <a:lvl4pPr marL="0" marR="0" indent="1371600" algn="l" defTabSz="825500" rtl="0" latinLnBrk="0">
+              <a:lnSpc>
+                <a:spcPct val="140000"/>
+              </a:lnSpc>
+              <a:spcBef>
+                <a:spcPts val="0"/>
+              </a:spcBef>
+              <a:spcAft>
+                <a:spcPts val="0"/>
+              </a:spcAft>
+              <a:buClrTx/>
+              <a:buSzTx/>
+              <a:buFontTx/>
+              <a:buNone/>
+              <a:tabLst/>
+              <a:defRPr sz="5400" b="1" i="0" u="none" strike="noStrike" cap="none" spc="-53" baseline="0">
+                <a:solidFill>
+                  <a:srgbClr val="000000"/>
+                </a:solidFill>
+                <a:uFillTx/>
+                <a:latin typeface="Proxima Nova"/>
+                <a:ea typeface="Proxima Nova"/>
+                <a:cs typeface="Proxima Nova"/>
+                <a:sym typeface="Proxima Nova"/>
+              </a:defRPr>
+            </a:lvl4pPr>
+            <a:lvl5pPr marL="0" marR="0" indent="1828800" algn="l" defTabSz="825500" rtl="0" latinLnBrk="0">
+              <a:lnSpc>
+                <a:spcPct val="140000"/>
+              </a:lnSpc>
+              <a:spcBef>
+                <a:spcPts val="0"/>
+              </a:spcBef>
+              <a:spcAft>
+                <a:spcPts val="0"/>
+              </a:spcAft>
+              <a:buClrTx/>
+              <a:buSzTx/>
+              <a:buFontTx/>
+              <a:buNone/>
+              <a:tabLst/>
+              <a:defRPr sz="5400" b="1" i="0" u="none" strike="noStrike" cap="none" spc="-53" baseline="0">
+                <a:solidFill>
+                  <a:srgbClr val="000000"/>
+                </a:solidFill>
+                <a:uFillTx/>
+                <a:latin typeface="Proxima Nova"/>
+                <a:ea typeface="Proxima Nova"/>
+                <a:cs typeface="Proxima Nova"/>
+                <a:sym typeface="Proxima Nova"/>
+              </a:defRPr>
+            </a:lvl5pPr>
+            <a:lvl6pPr marL="4114800" marR="0" indent="-685800" algn="l" defTabSz="584200" rtl="0" latinLnBrk="0">
+              <a:lnSpc>
+                <a:spcPct val="80000"/>
+              </a:lnSpc>
+              <a:spcBef>
+                <a:spcPts val="2400"/>
+              </a:spcBef>
+              <a:spcAft>
+                <a:spcPts val="0"/>
+              </a:spcAft>
+              <a:buClr>
+                <a:srgbClr val="57BEF0"/>
+              </a:buClr>
+              <a:buSzPct val="250000"/>
+              <a:buFontTx/>
+              <a:buChar char="-"/>
+              <a:tabLst/>
+              <a:defRPr sz="4200" b="1" i="0" u="none" strike="noStrike" cap="none" spc="0" baseline="0">
+                <a:solidFill>
+                  <a:srgbClr val="53585F"/>
+                </a:solidFill>
+                <a:uFillTx/>
+                <a:latin typeface="Proxima Nova"/>
+                <a:ea typeface="Proxima Nova"/>
+                <a:cs typeface="Proxima Nova"/>
+                <a:sym typeface="Proxima Nova"/>
+              </a:defRPr>
+            </a:lvl6pPr>
+            <a:lvl7pPr marL="4800600" marR="0" indent="-685800" algn="l" defTabSz="584200" rtl="0" latinLnBrk="0">
+              <a:lnSpc>
+                <a:spcPct val="80000"/>
+              </a:lnSpc>
+              <a:spcBef>
+                <a:spcPts val="2400"/>
+              </a:spcBef>
+              <a:spcAft>
+                <a:spcPts val="0"/>
+              </a:spcAft>
+              <a:buClr>
+                <a:srgbClr val="57BEF0"/>
+              </a:buClr>
+              <a:buSzPct val="250000"/>
+              <a:buFontTx/>
+              <a:buChar char="-"/>
+              <a:tabLst/>
+              <a:defRPr sz="4200" b="1" i="0" u="none" strike="noStrike" cap="none" spc="0" baseline="0">
+                <a:solidFill>
+                  <a:srgbClr val="53585F"/>
+                </a:solidFill>
+                <a:uFillTx/>
+                <a:latin typeface="Proxima Nova"/>
+                <a:ea typeface="Proxima Nova"/>
+                <a:cs typeface="Proxima Nova"/>
+                <a:sym typeface="Proxima Nova"/>
+              </a:defRPr>
+            </a:lvl7pPr>
+            <a:lvl8pPr marL="5486400" marR="0" indent="-685800" algn="l" defTabSz="584200" rtl="0" latinLnBrk="0">
+              <a:lnSpc>
+                <a:spcPct val="80000"/>
+              </a:lnSpc>
+              <a:spcBef>
+                <a:spcPts val="2400"/>
+              </a:spcBef>
+              <a:spcAft>
+                <a:spcPts val="0"/>
+              </a:spcAft>
+              <a:buClr>
+                <a:srgbClr val="57BEF0"/>
+              </a:buClr>
+              <a:buSzPct val="250000"/>
+              <a:buFontTx/>
+              <a:buChar char="-"/>
+              <a:tabLst/>
+              <a:defRPr sz="4200" b="1" i="0" u="none" strike="noStrike" cap="none" spc="0" baseline="0">
+                <a:solidFill>
+                  <a:srgbClr val="53585F"/>
+                </a:solidFill>
+                <a:uFillTx/>
+                <a:latin typeface="Proxima Nova"/>
+                <a:ea typeface="Proxima Nova"/>
+                <a:cs typeface="Proxima Nova"/>
+                <a:sym typeface="Proxima Nova"/>
+              </a:defRPr>
+            </a:lvl8pPr>
+            <a:lvl9pPr marL="6172200" marR="0" indent="-685800" algn="l" defTabSz="584200" rtl="0" latinLnBrk="0">
+              <a:lnSpc>
+                <a:spcPct val="80000"/>
+              </a:lnSpc>
+              <a:spcBef>
+                <a:spcPts val="2400"/>
+              </a:spcBef>
+              <a:spcAft>
+                <a:spcPts val="0"/>
+              </a:spcAft>
+              <a:buClr>
+                <a:srgbClr val="57BEF0"/>
+              </a:buClr>
+              <a:buSzPct val="250000"/>
+              <a:buFontTx/>
+              <a:buChar char="-"/>
+              <a:tabLst/>
+              <a:defRPr sz="4200" b="1" i="0" u="none" strike="noStrike" cap="none" spc="0" baseline="0">
+                <a:solidFill>
+                  <a:srgbClr val="53585F"/>
+                </a:solidFill>
+                <a:uFillTx/>
+                <a:latin typeface="Proxima Nova"/>
+                <a:ea typeface="Proxima Nova"/>
+                <a:cs typeface="Proxima Nova"/>
+                <a:sym typeface="Proxima Nova"/>
+              </a:defRPr>
+            </a:lvl9pPr>
+          </a:lstStyle>
+          <a:p>
+            <a:pPr algn="ctr" hangingPunct="1"/>
+            <a:r>
+              <a:rPr lang="en-US" dirty="0"/>
+              <a:t>Polynomial</a:t>
+            </a:r>
+          </a:p>
+          <a:p>
+            <a:pPr algn="ctr" hangingPunct="1"/>
+            <a:r>
+              <a:rPr lang="en-US" dirty="0"/>
+              <a:t>y=x</a:t>
+            </a:r>
+            <a:r>
+              <a:rPr lang="en-US" baseline="30000" dirty="0"/>
+              <a:t>2</a:t>
+            </a:r>
+          </a:p>
+          <a:p>
+            <a:pPr algn="ctr" hangingPunct="1"/>
+            <a:endParaRPr lang="en-US" baseline="30000" dirty="0"/>
+          </a:p>
+          <a:p>
+            <a:pPr algn="ctr" hangingPunct="1"/>
+            <a:r>
+              <a:rPr lang="en-US" dirty="0"/>
+              <a:t>O(n</a:t>
+            </a:r>
+            <a:r>
+              <a:rPr lang="en-US" baseline="30000" dirty="0"/>
+              <a:t>2</a:t>
+            </a:r>
+            <a:r>
+              <a:rPr lang="en-US" dirty="0"/>
+              <a:t>)</a:t>
+            </a:r>
+          </a:p>
+        </p:txBody>
+      </p:sp>
+      <p:sp>
+        <p:nvSpPr>
+          <p:cNvPr id="10" name="Text Placeholder 3">
+            <a:extLst>
+              <a:ext uri="{FF2B5EF4-FFF2-40B4-BE49-F238E27FC236}">
+                <a16:creationId xmlns:a16="http://schemas.microsoft.com/office/drawing/2014/main" id="{784C659A-12DE-C047-26C8-0E33E386AEDD}"/>
+              </a:ext>
+            </a:extLst>
+          </p:cNvPr>
+          <p:cNvSpPr txBox="1">
+            <a:spLocks/>
+          </p:cNvSpPr>
+          <p:nvPr/>
+        </p:nvSpPr>
+        <p:spPr>
+          <a:xfrm>
+            <a:off x="16581291" y="4989938"/>
+            <a:ext cx="4008005" cy="4169635"/>
+          </a:xfrm>
+          <a:prstGeom prst="rect">
+            <a:avLst/>
+          </a:prstGeom>
+          <a:ln w="12700">
+            <a:miter lim="400000"/>
+          </a:ln>
+          <a:extLst>
+            <a:ext uri="{C572A759-6A51-4108-AA02-DFA0A04FC94B}">
+              <ma14:wrappingTextBoxFlag xmlns="" xmlns:m="http://schemas.openxmlformats.org/officeDocument/2006/math" xmlns:a14="http://schemas.microsoft.com/office/drawing/2010/main" xmlns:ma14="http://schemas.microsoft.com/office/mac/drawingml/2011/main" val="1"/>
+            </a:ext>
+          </a:extLst>
+        </p:spPr>
+        <p:txBody>
+          <a:bodyPr lIns="50800" tIns="50800" rIns="50800" bIns="50800">
+            <a:normAutofit lnSpcReduction="10000"/>
+          </a:bodyPr>
+          <a:lstStyle>
+            <a:lvl1pPr marL="0" marR="0" indent="0" algn="l" defTabSz="825500" rtl="0" latinLnBrk="0">
+              <a:lnSpc>
+                <a:spcPct val="140000"/>
+              </a:lnSpc>
+              <a:spcBef>
+                <a:spcPts val="0"/>
+              </a:spcBef>
+              <a:spcAft>
+                <a:spcPts val="0"/>
+              </a:spcAft>
+              <a:buClrTx/>
+              <a:buSzTx/>
+              <a:buFontTx/>
+              <a:buNone/>
+              <a:tabLst/>
+              <a:defRPr sz="5400" b="1" i="0" u="none" strike="noStrike" cap="none" spc="-53" baseline="0">
+                <a:solidFill>
+                  <a:srgbClr val="000000"/>
+                </a:solidFill>
+                <a:uFillTx/>
+                <a:latin typeface="Proxima Nova"/>
+                <a:ea typeface="Proxima Nova"/>
+                <a:cs typeface="Proxima Nova"/>
+                <a:sym typeface="Proxima Nova"/>
+              </a:defRPr>
+            </a:lvl1pPr>
+            <a:lvl2pPr marL="0" marR="0" indent="457200" algn="l" defTabSz="825500" rtl="0" latinLnBrk="0">
+              <a:lnSpc>
+                <a:spcPct val="140000"/>
+              </a:lnSpc>
+              <a:spcBef>
+                <a:spcPts val="0"/>
+              </a:spcBef>
+              <a:spcAft>
+                <a:spcPts val="0"/>
+              </a:spcAft>
+              <a:buClrTx/>
+              <a:buSzTx/>
+              <a:buFontTx/>
+              <a:buNone/>
+              <a:tabLst/>
+              <a:defRPr sz="5400" b="1" i="0" u="none" strike="noStrike" cap="none" spc="-53" baseline="0">
+                <a:solidFill>
+                  <a:srgbClr val="000000"/>
+                </a:solidFill>
+                <a:uFillTx/>
+                <a:latin typeface="Proxima Nova"/>
+                <a:ea typeface="Proxima Nova"/>
+                <a:cs typeface="Proxima Nova"/>
+                <a:sym typeface="Proxima Nova"/>
+              </a:defRPr>
+            </a:lvl2pPr>
+            <a:lvl3pPr marL="0" marR="0" indent="914400" algn="l" defTabSz="825500" rtl="0" latinLnBrk="0">
+              <a:lnSpc>
+                <a:spcPct val="140000"/>
+              </a:lnSpc>
+              <a:spcBef>
+                <a:spcPts val="0"/>
+              </a:spcBef>
+              <a:spcAft>
+                <a:spcPts val="0"/>
+              </a:spcAft>
+              <a:buClrTx/>
+              <a:buSzTx/>
+              <a:buFontTx/>
+              <a:buNone/>
+              <a:tabLst/>
+              <a:defRPr sz="5400" b="1" i="0" u="none" strike="noStrike" cap="none" spc="-53" baseline="0">
+                <a:solidFill>
+                  <a:srgbClr val="000000"/>
+                </a:solidFill>
+                <a:uFillTx/>
+                <a:latin typeface="Proxima Nova"/>
+                <a:ea typeface="Proxima Nova"/>
+                <a:cs typeface="Proxima Nova"/>
+                <a:sym typeface="Proxima Nova"/>
+              </a:defRPr>
+            </a:lvl3pPr>
+            <a:lvl4pPr marL="0" marR="0" indent="1371600" algn="l" defTabSz="825500" rtl="0" latinLnBrk="0">
+              <a:lnSpc>
+                <a:spcPct val="140000"/>
+              </a:lnSpc>
+              <a:spcBef>
+                <a:spcPts val="0"/>
+              </a:spcBef>
+              <a:spcAft>
+                <a:spcPts val="0"/>
+              </a:spcAft>
+              <a:buClrTx/>
+              <a:buSzTx/>
+              <a:buFontTx/>
+              <a:buNone/>
+              <a:tabLst/>
+              <a:defRPr sz="5400" b="1" i="0" u="none" strike="noStrike" cap="none" spc="-53" baseline="0">
+                <a:solidFill>
+                  <a:srgbClr val="000000"/>
+                </a:solidFill>
+                <a:uFillTx/>
+                <a:latin typeface="Proxima Nova"/>
+                <a:ea typeface="Proxima Nova"/>
+                <a:cs typeface="Proxima Nova"/>
+                <a:sym typeface="Proxima Nova"/>
+              </a:defRPr>
+            </a:lvl4pPr>
+            <a:lvl5pPr marL="0" marR="0" indent="1828800" algn="l" defTabSz="825500" rtl="0" latinLnBrk="0">
+              <a:lnSpc>
+                <a:spcPct val="140000"/>
+              </a:lnSpc>
+              <a:spcBef>
+                <a:spcPts val="0"/>
+              </a:spcBef>
+              <a:spcAft>
+                <a:spcPts val="0"/>
+              </a:spcAft>
+              <a:buClrTx/>
+              <a:buSzTx/>
+              <a:buFontTx/>
+              <a:buNone/>
+              <a:tabLst/>
+              <a:defRPr sz="5400" b="1" i="0" u="none" strike="noStrike" cap="none" spc="-53" baseline="0">
+                <a:solidFill>
+                  <a:srgbClr val="000000"/>
+                </a:solidFill>
+                <a:uFillTx/>
+                <a:latin typeface="Proxima Nova"/>
+                <a:ea typeface="Proxima Nova"/>
+                <a:cs typeface="Proxima Nova"/>
+                <a:sym typeface="Proxima Nova"/>
+              </a:defRPr>
+            </a:lvl5pPr>
+            <a:lvl6pPr marL="4114800" marR="0" indent="-685800" algn="l" defTabSz="584200" rtl="0" latinLnBrk="0">
+              <a:lnSpc>
+                <a:spcPct val="80000"/>
+              </a:lnSpc>
+              <a:spcBef>
+                <a:spcPts val="2400"/>
+              </a:spcBef>
+              <a:spcAft>
+                <a:spcPts val="0"/>
+              </a:spcAft>
+              <a:buClr>
+                <a:srgbClr val="57BEF0"/>
+              </a:buClr>
+              <a:buSzPct val="250000"/>
+              <a:buFontTx/>
+              <a:buChar char="-"/>
+              <a:tabLst/>
+              <a:defRPr sz="4200" b="1" i="0" u="none" strike="noStrike" cap="none" spc="0" baseline="0">
+                <a:solidFill>
+                  <a:srgbClr val="53585F"/>
+                </a:solidFill>
+                <a:uFillTx/>
+                <a:latin typeface="Proxima Nova"/>
+                <a:ea typeface="Proxima Nova"/>
+                <a:cs typeface="Proxima Nova"/>
+                <a:sym typeface="Proxima Nova"/>
+              </a:defRPr>
+            </a:lvl6pPr>
+            <a:lvl7pPr marL="4800600" marR="0" indent="-685800" algn="l" defTabSz="584200" rtl="0" latinLnBrk="0">
+              <a:lnSpc>
+                <a:spcPct val="80000"/>
+              </a:lnSpc>
+              <a:spcBef>
+                <a:spcPts val="2400"/>
+              </a:spcBef>
+              <a:spcAft>
+                <a:spcPts val="0"/>
+              </a:spcAft>
+              <a:buClr>
+                <a:srgbClr val="57BEF0"/>
+              </a:buClr>
+              <a:buSzPct val="250000"/>
+              <a:buFontTx/>
+              <a:buChar char="-"/>
+              <a:tabLst/>
+              <a:defRPr sz="4200" b="1" i="0" u="none" strike="noStrike" cap="none" spc="0" baseline="0">
+                <a:solidFill>
+                  <a:srgbClr val="53585F"/>
+                </a:solidFill>
+                <a:uFillTx/>
+                <a:latin typeface="Proxima Nova"/>
+                <a:ea typeface="Proxima Nova"/>
+                <a:cs typeface="Proxima Nova"/>
+                <a:sym typeface="Proxima Nova"/>
+              </a:defRPr>
+            </a:lvl7pPr>
+            <a:lvl8pPr marL="5486400" marR="0" indent="-685800" algn="l" defTabSz="584200" rtl="0" latinLnBrk="0">
+              <a:lnSpc>
+                <a:spcPct val="80000"/>
+              </a:lnSpc>
+              <a:spcBef>
+                <a:spcPts val="2400"/>
+              </a:spcBef>
+              <a:spcAft>
+                <a:spcPts val="0"/>
+              </a:spcAft>
+              <a:buClr>
+                <a:srgbClr val="57BEF0"/>
+              </a:buClr>
+              <a:buSzPct val="250000"/>
+              <a:buFontTx/>
+              <a:buChar char="-"/>
+              <a:tabLst/>
+              <a:defRPr sz="4200" b="1" i="0" u="none" strike="noStrike" cap="none" spc="0" baseline="0">
+                <a:solidFill>
+                  <a:srgbClr val="53585F"/>
+                </a:solidFill>
+                <a:uFillTx/>
+                <a:latin typeface="Proxima Nova"/>
+                <a:ea typeface="Proxima Nova"/>
+                <a:cs typeface="Proxima Nova"/>
+                <a:sym typeface="Proxima Nova"/>
+              </a:defRPr>
+            </a:lvl8pPr>
+            <a:lvl9pPr marL="6172200" marR="0" indent="-685800" algn="l" defTabSz="584200" rtl="0" latinLnBrk="0">
+              <a:lnSpc>
+                <a:spcPct val="80000"/>
+              </a:lnSpc>
+              <a:spcBef>
+                <a:spcPts val="2400"/>
+              </a:spcBef>
+              <a:spcAft>
+                <a:spcPts val="0"/>
+              </a:spcAft>
+              <a:buClr>
+                <a:srgbClr val="57BEF0"/>
+              </a:buClr>
+              <a:buSzPct val="250000"/>
+              <a:buFontTx/>
+              <a:buChar char="-"/>
+              <a:tabLst/>
+              <a:defRPr sz="4200" b="1" i="0" u="none" strike="noStrike" cap="none" spc="0" baseline="0">
+                <a:solidFill>
+                  <a:srgbClr val="53585F"/>
+                </a:solidFill>
+                <a:uFillTx/>
+                <a:latin typeface="Proxima Nova"/>
+                <a:ea typeface="Proxima Nova"/>
+                <a:cs typeface="Proxima Nova"/>
+                <a:sym typeface="Proxima Nova"/>
+              </a:defRPr>
+            </a:lvl9pPr>
+          </a:lstStyle>
+          <a:p>
+            <a:pPr algn="ctr" hangingPunct="1"/>
+            <a:r>
+              <a:rPr lang="en-US" dirty="0"/>
+              <a:t>Exponential</a:t>
+            </a:r>
+          </a:p>
+          <a:p>
+            <a:pPr algn="ctr" hangingPunct="1"/>
+            <a:r>
+              <a:rPr lang="en-US" dirty="0"/>
+              <a:t>y=e</a:t>
+            </a:r>
+            <a:r>
+              <a:rPr lang="en-US" baseline="30000" dirty="0"/>
+              <a:t>x</a:t>
+            </a:r>
+          </a:p>
+          <a:p>
+            <a:pPr algn="ctr" hangingPunct="1"/>
+            <a:endParaRPr lang="en-US" baseline="30000" dirty="0"/>
+          </a:p>
+          <a:p>
+            <a:pPr algn="ctr" hangingPunct="1"/>
+            <a:r>
+              <a:rPr lang="en-US" dirty="0"/>
+              <a:t>O(</a:t>
+            </a:r>
+            <a:r>
+              <a:rPr lang="en-US" dirty="0" err="1"/>
+              <a:t>e</a:t>
+            </a:r>
+            <a:r>
+              <a:rPr lang="en-US" baseline="30000" dirty="0" err="1"/>
+              <a:t>n</a:t>
+            </a:r>
+            <a:r>
+              <a:rPr lang="en-US" dirty="0"/>
+              <a:t>)</a:t>
+            </a:r>
+            <a:endParaRPr lang="en-US" baseline="30000" dirty="0"/>
+          </a:p>
+        </p:txBody>
+      </p:sp>
+      <p:sp>
+        <p:nvSpPr>
+          <p:cNvPr id="11" name="Text Placeholder 3">
+            <a:extLst>
+              <a:ext uri="{FF2B5EF4-FFF2-40B4-BE49-F238E27FC236}">
+                <a16:creationId xmlns:a16="http://schemas.microsoft.com/office/drawing/2014/main" id="{E592ABFA-FD3D-528D-2E08-48A8D0E21F60}"/>
+              </a:ext>
+            </a:extLst>
+          </p:cNvPr>
+          <p:cNvSpPr txBox="1">
+            <a:spLocks/>
+          </p:cNvSpPr>
+          <p:nvPr/>
+        </p:nvSpPr>
+        <p:spPr>
+          <a:xfrm>
+            <a:off x="8968151" y="4988787"/>
+            <a:ext cx="4008005" cy="4141928"/>
+          </a:xfrm>
+          <a:prstGeom prst="rect">
+            <a:avLst/>
+          </a:prstGeom>
+          <a:ln w="12700">
+            <a:miter lim="400000"/>
+          </a:ln>
+          <a:extLst>
+            <a:ext uri="{C572A759-6A51-4108-AA02-DFA0A04FC94B}">
+              <ma14:wrappingTextBoxFlag xmlns="" xmlns:m="http://schemas.openxmlformats.org/officeDocument/2006/math" xmlns:a14="http://schemas.microsoft.com/office/drawing/2010/main" xmlns:ma14="http://schemas.microsoft.com/office/mac/drawingml/2011/main" val="1"/>
+            </a:ext>
+          </a:extLst>
+        </p:spPr>
+        <p:txBody>
+          <a:bodyPr lIns="50800" tIns="50800" rIns="50800" bIns="50800">
+            <a:normAutofit fontScale="77500" lnSpcReduction="20000"/>
+          </a:bodyPr>
+          <a:lstStyle>
+            <a:lvl1pPr marL="0" marR="0" indent="0" algn="l" defTabSz="825500" rtl="0" latinLnBrk="0">
+              <a:lnSpc>
+                <a:spcPct val="140000"/>
+              </a:lnSpc>
+              <a:spcBef>
+                <a:spcPts val="0"/>
+              </a:spcBef>
+              <a:spcAft>
+                <a:spcPts val="0"/>
+              </a:spcAft>
+              <a:buClrTx/>
+              <a:buSzTx/>
+              <a:buFontTx/>
+              <a:buNone/>
+              <a:tabLst/>
+              <a:defRPr sz="5400" b="1" i="0" u="none" strike="noStrike" cap="none" spc="-53" baseline="0">
+                <a:solidFill>
+                  <a:srgbClr val="000000"/>
+                </a:solidFill>
+                <a:uFillTx/>
+                <a:latin typeface="Proxima Nova"/>
+                <a:ea typeface="Proxima Nova"/>
+                <a:cs typeface="Proxima Nova"/>
+                <a:sym typeface="Proxima Nova"/>
+              </a:defRPr>
+            </a:lvl1pPr>
+            <a:lvl2pPr marL="0" marR="0" indent="457200" algn="l" defTabSz="825500" rtl="0" latinLnBrk="0">
+              <a:lnSpc>
+                <a:spcPct val="140000"/>
+              </a:lnSpc>
+              <a:spcBef>
+                <a:spcPts val="0"/>
+              </a:spcBef>
+              <a:spcAft>
+                <a:spcPts val="0"/>
+              </a:spcAft>
+              <a:buClrTx/>
+              <a:buSzTx/>
+              <a:buFontTx/>
+              <a:buNone/>
+              <a:tabLst/>
+              <a:defRPr sz="5400" b="1" i="0" u="none" strike="noStrike" cap="none" spc="-53" baseline="0">
+                <a:solidFill>
+                  <a:srgbClr val="000000"/>
+                </a:solidFill>
+                <a:uFillTx/>
+                <a:latin typeface="Proxima Nova"/>
+                <a:ea typeface="Proxima Nova"/>
+                <a:cs typeface="Proxima Nova"/>
+                <a:sym typeface="Proxima Nova"/>
+              </a:defRPr>
+            </a:lvl2pPr>
+            <a:lvl3pPr marL="0" marR="0" indent="914400" algn="l" defTabSz="825500" rtl="0" latinLnBrk="0">
+              <a:lnSpc>
+                <a:spcPct val="140000"/>
+              </a:lnSpc>
+              <a:spcBef>
+                <a:spcPts val="0"/>
+              </a:spcBef>
+              <a:spcAft>
+                <a:spcPts val="0"/>
+              </a:spcAft>
+              <a:buClrTx/>
+              <a:buSzTx/>
+              <a:buFontTx/>
+              <a:buNone/>
+              <a:tabLst/>
+              <a:defRPr sz="5400" b="1" i="0" u="none" strike="noStrike" cap="none" spc="-53" baseline="0">
+                <a:solidFill>
+                  <a:srgbClr val="000000"/>
+                </a:solidFill>
+                <a:uFillTx/>
+                <a:latin typeface="Proxima Nova"/>
+                <a:ea typeface="Proxima Nova"/>
+                <a:cs typeface="Proxima Nova"/>
+                <a:sym typeface="Proxima Nova"/>
+              </a:defRPr>
+            </a:lvl3pPr>
+            <a:lvl4pPr marL="0" marR="0" indent="1371600" algn="l" defTabSz="825500" rtl="0" latinLnBrk="0">
+              <a:lnSpc>
+                <a:spcPct val="140000"/>
+              </a:lnSpc>
+              <a:spcBef>
+                <a:spcPts val="0"/>
+              </a:spcBef>
+              <a:spcAft>
+                <a:spcPts val="0"/>
+              </a:spcAft>
+              <a:buClrTx/>
+              <a:buSzTx/>
+              <a:buFontTx/>
+              <a:buNone/>
+              <a:tabLst/>
+              <a:defRPr sz="5400" b="1" i="0" u="none" strike="noStrike" cap="none" spc="-53" baseline="0">
+                <a:solidFill>
+                  <a:srgbClr val="000000"/>
+                </a:solidFill>
+                <a:uFillTx/>
+                <a:latin typeface="Proxima Nova"/>
+                <a:ea typeface="Proxima Nova"/>
+                <a:cs typeface="Proxima Nova"/>
+                <a:sym typeface="Proxima Nova"/>
+              </a:defRPr>
+            </a:lvl4pPr>
+            <a:lvl5pPr marL="0" marR="0" indent="1828800" algn="l" defTabSz="825500" rtl="0" latinLnBrk="0">
+              <a:lnSpc>
+                <a:spcPct val="140000"/>
+              </a:lnSpc>
+              <a:spcBef>
+                <a:spcPts val="0"/>
+              </a:spcBef>
+              <a:spcAft>
+                <a:spcPts val="0"/>
+              </a:spcAft>
+              <a:buClrTx/>
+              <a:buSzTx/>
+              <a:buFontTx/>
+              <a:buNone/>
+              <a:tabLst/>
+              <a:defRPr sz="5400" b="1" i="0" u="none" strike="noStrike" cap="none" spc="-53" baseline="0">
+                <a:solidFill>
+                  <a:srgbClr val="000000"/>
+                </a:solidFill>
+                <a:uFillTx/>
+                <a:latin typeface="Proxima Nova"/>
+                <a:ea typeface="Proxima Nova"/>
+                <a:cs typeface="Proxima Nova"/>
+                <a:sym typeface="Proxima Nova"/>
+              </a:defRPr>
+            </a:lvl5pPr>
+            <a:lvl6pPr marL="4114800" marR="0" indent="-685800" algn="l" defTabSz="584200" rtl="0" latinLnBrk="0">
+              <a:lnSpc>
+                <a:spcPct val="80000"/>
+              </a:lnSpc>
+              <a:spcBef>
+                <a:spcPts val="2400"/>
+              </a:spcBef>
+              <a:spcAft>
+                <a:spcPts val="0"/>
+              </a:spcAft>
+              <a:buClr>
+                <a:srgbClr val="57BEF0"/>
+              </a:buClr>
+              <a:buSzPct val="250000"/>
+              <a:buFontTx/>
+              <a:buChar char="-"/>
+              <a:tabLst/>
+              <a:defRPr sz="4200" b="1" i="0" u="none" strike="noStrike" cap="none" spc="0" baseline="0">
+                <a:solidFill>
+                  <a:srgbClr val="53585F"/>
+                </a:solidFill>
+                <a:uFillTx/>
+                <a:latin typeface="Proxima Nova"/>
+                <a:ea typeface="Proxima Nova"/>
+                <a:cs typeface="Proxima Nova"/>
+                <a:sym typeface="Proxima Nova"/>
+              </a:defRPr>
+            </a:lvl6pPr>
+            <a:lvl7pPr marL="4800600" marR="0" indent="-685800" algn="l" defTabSz="584200" rtl="0" latinLnBrk="0">
+              <a:lnSpc>
+                <a:spcPct val="80000"/>
+              </a:lnSpc>
+              <a:spcBef>
+                <a:spcPts val="2400"/>
+              </a:spcBef>
+              <a:spcAft>
+                <a:spcPts val="0"/>
+              </a:spcAft>
+              <a:buClr>
+                <a:srgbClr val="57BEF0"/>
+              </a:buClr>
+              <a:buSzPct val="250000"/>
+              <a:buFontTx/>
+              <a:buChar char="-"/>
+              <a:tabLst/>
+              <a:defRPr sz="4200" b="1" i="0" u="none" strike="noStrike" cap="none" spc="0" baseline="0">
+                <a:solidFill>
+                  <a:srgbClr val="53585F"/>
+                </a:solidFill>
+                <a:uFillTx/>
+                <a:latin typeface="Proxima Nova"/>
+                <a:ea typeface="Proxima Nova"/>
+                <a:cs typeface="Proxima Nova"/>
+                <a:sym typeface="Proxima Nova"/>
+              </a:defRPr>
+            </a:lvl7pPr>
+            <a:lvl8pPr marL="5486400" marR="0" indent="-685800" algn="l" defTabSz="584200" rtl="0" latinLnBrk="0">
+              <a:lnSpc>
+                <a:spcPct val="80000"/>
+              </a:lnSpc>
+              <a:spcBef>
+                <a:spcPts val="2400"/>
+              </a:spcBef>
+              <a:spcAft>
+                <a:spcPts val="0"/>
+              </a:spcAft>
+              <a:buClr>
+                <a:srgbClr val="57BEF0"/>
+              </a:buClr>
+              <a:buSzPct val="250000"/>
+              <a:buFontTx/>
+              <a:buChar char="-"/>
+              <a:tabLst/>
+              <a:defRPr sz="4200" b="1" i="0" u="none" strike="noStrike" cap="none" spc="0" baseline="0">
+                <a:solidFill>
+                  <a:srgbClr val="53585F"/>
+                </a:solidFill>
+                <a:uFillTx/>
+                <a:latin typeface="Proxima Nova"/>
+                <a:ea typeface="Proxima Nova"/>
+                <a:cs typeface="Proxima Nova"/>
+                <a:sym typeface="Proxima Nova"/>
+              </a:defRPr>
+            </a:lvl8pPr>
+            <a:lvl9pPr marL="6172200" marR="0" indent="-685800" algn="l" defTabSz="584200" rtl="0" latinLnBrk="0">
+              <a:lnSpc>
+                <a:spcPct val="80000"/>
+              </a:lnSpc>
+              <a:spcBef>
+                <a:spcPts val="2400"/>
+              </a:spcBef>
+              <a:spcAft>
+                <a:spcPts val="0"/>
+              </a:spcAft>
+              <a:buClr>
+                <a:srgbClr val="57BEF0"/>
+              </a:buClr>
+              <a:buSzPct val="250000"/>
+              <a:buFontTx/>
+              <a:buChar char="-"/>
+              <a:tabLst/>
+              <a:defRPr sz="4200" b="1" i="0" u="none" strike="noStrike" cap="none" spc="0" baseline="0">
+                <a:solidFill>
+                  <a:srgbClr val="53585F"/>
+                </a:solidFill>
+                <a:uFillTx/>
+                <a:latin typeface="Proxima Nova"/>
+                <a:ea typeface="Proxima Nova"/>
+                <a:cs typeface="Proxima Nova"/>
+                <a:sym typeface="Proxima Nova"/>
+              </a:defRPr>
+            </a:lvl9pPr>
+          </a:lstStyle>
+          <a:p>
+            <a:pPr algn="ctr" hangingPunct="1"/>
+            <a:r>
+              <a:rPr lang="en-US" dirty="0"/>
+              <a:t>Linear</a:t>
+            </a:r>
+          </a:p>
+          <a:p>
+            <a:pPr algn="ctr" hangingPunct="1"/>
+            <a:r>
+              <a:rPr lang="en-US" dirty="0"/>
+              <a:t>Logarithmic</a:t>
+            </a:r>
+          </a:p>
+          <a:p>
+            <a:pPr algn="ctr" hangingPunct="1"/>
+            <a:r>
+              <a:rPr lang="en-US" dirty="0"/>
+              <a:t>y=log(x)</a:t>
+            </a:r>
+          </a:p>
+          <a:p>
+            <a:pPr algn="ctr" hangingPunct="1"/>
+            <a:endParaRPr lang="en-US" dirty="0"/>
+          </a:p>
+          <a:p>
+            <a:pPr algn="ctr" hangingPunct="1"/>
+            <a:r>
+              <a:rPr lang="en-US" dirty="0"/>
+              <a:t>O(nlog</a:t>
+            </a:r>
+            <a:r>
+              <a:rPr lang="en-US" baseline="-25000" dirty="0"/>
+              <a:t>2</a:t>
+            </a:r>
+            <a:r>
+              <a:rPr lang="en-US" dirty="0"/>
+              <a:t>(n))</a:t>
+            </a:r>
+          </a:p>
+        </p:txBody>
+      </p:sp>
+      <p:sp>
+        <p:nvSpPr>
+          <p:cNvPr id="12" name="Text Placeholder 3">
+            <a:extLst>
+              <a:ext uri="{FF2B5EF4-FFF2-40B4-BE49-F238E27FC236}">
+                <a16:creationId xmlns:a16="http://schemas.microsoft.com/office/drawing/2014/main" id="{4A3B27F8-5C95-E7A0-5E59-DD1B738D70CD}"/>
+              </a:ext>
+            </a:extLst>
+          </p:cNvPr>
+          <p:cNvSpPr txBox="1">
+            <a:spLocks/>
+          </p:cNvSpPr>
+          <p:nvPr/>
+        </p:nvSpPr>
+        <p:spPr>
+          <a:xfrm>
+            <a:off x="20186426" y="4988787"/>
+            <a:ext cx="4008005" cy="4169635"/>
+          </a:xfrm>
+          <a:prstGeom prst="rect">
+            <a:avLst/>
+          </a:prstGeom>
+          <a:ln w="12700">
+            <a:miter lim="400000"/>
+          </a:ln>
+          <a:extLst>
+            <a:ext uri="{C572A759-6A51-4108-AA02-DFA0A04FC94B}">
+              <ma14:wrappingTextBoxFlag xmlns="" xmlns:m="http://schemas.openxmlformats.org/officeDocument/2006/math" xmlns:a14="http://schemas.microsoft.com/office/drawing/2010/main" xmlns:ma14="http://schemas.microsoft.com/office/mac/drawingml/2011/main" val="1"/>
+            </a:ext>
+          </a:extLst>
+        </p:spPr>
+        <p:txBody>
+          <a:bodyPr lIns="50800" tIns="50800" rIns="50800" bIns="50800">
+            <a:normAutofit/>
+          </a:bodyPr>
+          <a:lstStyle>
+            <a:lvl1pPr marL="0" marR="0" indent="0" algn="l" defTabSz="825500" rtl="0" latinLnBrk="0">
+              <a:lnSpc>
+                <a:spcPct val="140000"/>
+              </a:lnSpc>
+              <a:spcBef>
+                <a:spcPts val="0"/>
+              </a:spcBef>
+              <a:spcAft>
+                <a:spcPts val="0"/>
+              </a:spcAft>
+              <a:buClrTx/>
+              <a:buSzTx/>
+              <a:buFontTx/>
+              <a:buNone/>
+              <a:tabLst/>
+              <a:defRPr sz="5400" b="1" i="0" u="none" strike="noStrike" cap="none" spc="-53" baseline="0">
+                <a:solidFill>
+                  <a:srgbClr val="000000"/>
+                </a:solidFill>
+                <a:uFillTx/>
+                <a:latin typeface="Proxima Nova"/>
+                <a:ea typeface="Proxima Nova"/>
+                <a:cs typeface="Proxima Nova"/>
+                <a:sym typeface="Proxima Nova"/>
+              </a:defRPr>
+            </a:lvl1pPr>
+            <a:lvl2pPr marL="0" marR="0" indent="457200" algn="l" defTabSz="825500" rtl="0" latinLnBrk="0">
+              <a:lnSpc>
+                <a:spcPct val="140000"/>
+              </a:lnSpc>
+              <a:spcBef>
+                <a:spcPts val="0"/>
+              </a:spcBef>
+              <a:spcAft>
+                <a:spcPts val="0"/>
+              </a:spcAft>
+              <a:buClrTx/>
+              <a:buSzTx/>
+              <a:buFontTx/>
+              <a:buNone/>
+              <a:tabLst/>
+              <a:defRPr sz="5400" b="1" i="0" u="none" strike="noStrike" cap="none" spc="-53" baseline="0">
+                <a:solidFill>
+                  <a:srgbClr val="000000"/>
+                </a:solidFill>
+                <a:uFillTx/>
+                <a:latin typeface="Proxima Nova"/>
+                <a:ea typeface="Proxima Nova"/>
+                <a:cs typeface="Proxima Nova"/>
+                <a:sym typeface="Proxima Nova"/>
+              </a:defRPr>
+            </a:lvl2pPr>
+            <a:lvl3pPr marL="0" marR="0" indent="914400" algn="l" defTabSz="825500" rtl="0" latinLnBrk="0">
+              <a:lnSpc>
+                <a:spcPct val="140000"/>
+              </a:lnSpc>
+              <a:spcBef>
+                <a:spcPts val="0"/>
+              </a:spcBef>
+              <a:spcAft>
+                <a:spcPts val="0"/>
+              </a:spcAft>
+              <a:buClrTx/>
+              <a:buSzTx/>
+              <a:buFontTx/>
+              <a:buNone/>
+              <a:tabLst/>
+              <a:defRPr sz="5400" b="1" i="0" u="none" strike="noStrike" cap="none" spc="-53" baseline="0">
+                <a:solidFill>
+                  <a:srgbClr val="000000"/>
+                </a:solidFill>
+                <a:uFillTx/>
+                <a:latin typeface="Proxima Nova"/>
+                <a:ea typeface="Proxima Nova"/>
+                <a:cs typeface="Proxima Nova"/>
+                <a:sym typeface="Proxima Nova"/>
+              </a:defRPr>
+            </a:lvl3pPr>
+            <a:lvl4pPr marL="0" marR="0" indent="1371600" algn="l" defTabSz="825500" rtl="0" latinLnBrk="0">
+              <a:lnSpc>
+                <a:spcPct val="140000"/>
+              </a:lnSpc>
+              <a:spcBef>
+                <a:spcPts val="0"/>
+              </a:spcBef>
+              <a:spcAft>
+                <a:spcPts val="0"/>
+              </a:spcAft>
+              <a:buClrTx/>
+              <a:buSzTx/>
+              <a:buFontTx/>
+              <a:buNone/>
+              <a:tabLst/>
+              <a:defRPr sz="5400" b="1" i="0" u="none" strike="noStrike" cap="none" spc="-53" baseline="0">
+                <a:solidFill>
+                  <a:srgbClr val="000000"/>
+                </a:solidFill>
+                <a:uFillTx/>
+                <a:latin typeface="Proxima Nova"/>
+                <a:ea typeface="Proxima Nova"/>
+                <a:cs typeface="Proxima Nova"/>
+                <a:sym typeface="Proxima Nova"/>
+              </a:defRPr>
+            </a:lvl4pPr>
+            <a:lvl5pPr marL="0" marR="0" indent="1828800" algn="l" defTabSz="825500" rtl="0" latinLnBrk="0">
+              <a:lnSpc>
+                <a:spcPct val="140000"/>
+              </a:lnSpc>
+              <a:spcBef>
+                <a:spcPts val="0"/>
+              </a:spcBef>
+              <a:spcAft>
+                <a:spcPts val="0"/>
+              </a:spcAft>
+              <a:buClrTx/>
+              <a:buSzTx/>
+              <a:buFontTx/>
+              <a:buNone/>
+              <a:tabLst/>
+              <a:defRPr sz="5400" b="1" i="0" u="none" strike="noStrike" cap="none" spc="-53" baseline="0">
+                <a:solidFill>
+                  <a:srgbClr val="000000"/>
+                </a:solidFill>
+                <a:uFillTx/>
+                <a:latin typeface="Proxima Nova"/>
+                <a:ea typeface="Proxima Nova"/>
+                <a:cs typeface="Proxima Nova"/>
+                <a:sym typeface="Proxima Nova"/>
+              </a:defRPr>
+            </a:lvl5pPr>
+            <a:lvl6pPr marL="4114800" marR="0" indent="-685800" algn="l" defTabSz="584200" rtl="0" latinLnBrk="0">
+              <a:lnSpc>
+                <a:spcPct val="80000"/>
+              </a:lnSpc>
+              <a:spcBef>
+                <a:spcPts val="2400"/>
+              </a:spcBef>
+              <a:spcAft>
+                <a:spcPts val="0"/>
+              </a:spcAft>
+              <a:buClr>
+                <a:srgbClr val="57BEF0"/>
+              </a:buClr>
+              <a:buSzPct val="250000"/>
+              <a:buFontTx/>
+              <a:buChar char="-"/>
+              <a:tabLst/>
+              <a:defRPr sz="4200" b="1" i="0" u="none" strike="noStrike" cap="none" spc="0" baseline="0">
+                <a:solidFill>
+                  <a:srgbClr val="53585F"/>
+                </a:solidFill>
+                <a:uFillTx/>
+                <a:latin typeface="Proxima Nova"/>
+                <a:ea typeface="Proxima Nova"/>
+                <a:cs typeface="Proxima Nova"/>
+                <a:sym typeface="Proxima Nova"/>
+              </a:defRPr>
+            </a:lvl6pPr>
+            <a:lvl7pPr marL="4800600" marR="0" indent="-685800" algn="l" defTabSz="584200" rtl="0" latinLnBrk="0">
+              <a:lnSpc>
+                <a:spcPct val="80000"/>
+              </a:lnSpc>
+              <a:spcBef>
+                <a:spcPts val="2400"/>
+              </a:spcBef>
+              <a:spcAft>
+                <a:spcPts val="0"/>
+              </a:spcAft>
+              <a:buClr>
+                <a:srgbClr val="57BEF0"/>
+              </a:buClr>
+              <a:buSzPct val="250000"/>
+              <a:buFontTx/>
+              <a:buChar char="-"/>
+              <a:tabLst/>
+              <a:defRPr sz="4200" b="1" i="0" u="none" strike="noStrike" cap="none" spc="0" baseline="0">
+                <a:solidFill>
+                  <a:srgbClr val="53585F"/>
+                </a:solidFill>
+                <a:uFillTx/>
+                <a:latin typeface="Proxima Nova"/>
+                <a:ea typeface="Proxima Nova"/>
+                <a:cs typeface="Proxima Nova"/>
+                <a:sym typeface="Proxima Nova"/>
+              </a:defRPr>
+            </a:lvl7pPr>
+            <a:lvl8pPr marL="5486400" marR="0" indent="-685800" algn="l" defTabSz="584200" rtl="0" latinLnBrk="0">
+              <a:lnSpc>
+                <a:spcPct val="80000"/>
+              </a:lnSpc>
+              <a:spcBef>
+                <a:spcPts val="2400"/>
+              </a:spcBef>
+              <a:spcAft>
+                <a:spcPts val="0"/>
+              </a:spcAft>
+              <a:buClr>
+                <a:srgbClr val="57BEF0"/>
+              </a:buClr>
+              <a:buSzPct val="250000"/>
+              <a:buFontTx/>
+              <a:buChar char="-"/>
+              <a:tabLst/>
+              <a:defRPr sz="4200" b="1" i="0" u="none" strike="noStrike" cap="none" spc="0" baseline="0">
+                <a:solidFill>
+                  <a:srgbClr val="53585F"/>
+                </a:solidFill>
+                <a:uFillTx/>
+                <a:latin typeface="Proxima Nova"/>
+                <a:ea typeface="Proxima Nova"/>
+                <a:cs typeface="Proxima Nova"/>
+                <a:sym typeface="Proxima Nova"/>
+              </a:defRPr>
+            </a:lvl8pPr>
+            <a:lvl9pPr marL="6172200" marR="0" indent="-685800" algn="l" defTabSz="584200" rtl="0" latinLnBrk="0">
+              <a:lnSpc>
+                <a:spcPct val="80000"/>
+              </a:lnSpc>
+              <a:spcBef>
+                <a:spcPts val="2400"/>
+              </a:spcBef>
+              <a:spcAft>
+                <a:spcPts val="0"/>
+              </a:spcAft>
+              <a:buClr>
+                <a:srgbClr val="57BEF0"/>
+              </a:buClr>
+              <a:buSzPct val="250000"/>
+              <a:buFontTx/>
+              <a:buChar char="-"/>
+              <a:tabLst/>
+              <a:defRPr sz="4200" b="1" i="0" u="none" strike="noStrike" cap="none" spc="0" baseline="0">
+                <a:solidFill>
+                  <a:srgbClr val="53585F"/>
+                </a:solidFill>
+                <a:uFillTx/>
+                <a:latin typeface="Proxima Nova"/>
+                <a:ea typeface="Proxima Nova"/>
+                <a:cs typeface="Proxima Nova"/>
+                <a:sym typeface="Proxima Nova"/>
+              </a:defRPr>
+            </a:lvl9pPr>
+          </a:lstStyle>
+          <a:p>
+            <a:pPr algn="ctr" hangingPunct="1"/>
+            <a:r>
+              <a:rPr lang="en-US" dirty="0"/>
+              <a:t>Factorial</a:t>
+            </a:r>
+            <a:endParaRPr lang="en-US" baseline="30000" dirty="0"/>
+          </a:p>
+          <a:p>
+            <a:pPr algn="ctr" hangingPunct="1"/>
+            <a:endParaRPr lang="en-US" baseline="30000" dirty="0"/>
+          </a:p>
+          <a:p>
+            <a:pPr algn="ctr" hangingPunct="1"/>
+            <a:endParaRPr lang="en-US" baseline="30000" dirty="0"/>
+          </a:p>
+          <a:p>
+            <a:pPr algn="ctr" hangingPunct="1"/>
+            <a:r>
+              <a:rPr lang="en-US" dirty="0"/>
+              <a:t>O(n!)</a:t>
+            </a:r>
+            <a:endParaRPr lang="en-US" baseline="30000" dirty="0"/>
+          </a:p>
+        </p:txBody>
+      </p:sp>
+      <p:cxnSp>
+        <p:nvCxnSpPr>
+          <p:cNvPr id="14" name="Straight Connector 13">
+            <a:extLst>
+              <a:ext uri="{FF2B5EF4-FFF2-40B4-BE49-F238E27FC236}">
+                <a16:creationId xmlns:a16="http://schemas.microsoft.com/office/drawing/2014/main" id="{034FC674-C69E-3A19-A20D-CB6DEF53D9DA}"/>
+              </a:ext>
+            </a:extLst>
+          </p:cNvPr>
+          <p:cNvCxnSpPr>
+            <a:cxnSpLocks/>
+          </p:cNvCxnSpPr>
+          <p:nvPr/>
+        </p:nvCxnSpPr>
+        <p:spPr>
+          <a:xfrm>
+            <a:off x="16498164" y="4149152"/>
+            <a:ext cx="0" cy="5417695"/>
+          </a:xfrm>
+          <a:prstGeom prst="line">
+            <a:avLst/>
+          </a:prstGeom>
+          <a:noFill/>
+          <a:ln w="254000" cap="flat">
+            <a:solidFill>
+              <a:srgbClr val="000000"/>
+            </a:solidFill>
+            <a:prstDash val="solid"/>
+            <a:miter lim="400000"/>
+          </a:ln>
+          <a:effectLst/>
+          <a:sp3d/>
+        </p:spPr>
+        <p:style>
+          <a:lnRef idx="0">
+            <a:scrgbClr r="0" g="0" b="0"/>
+          </a:lnRef>
+          <a:fillRef idx="0">
+            <a:scrgbClr r="0" g="0" b="0"/>
+          </a:fillRef>
+          <a:effectRef idx="0">
+            <a:scrgbClr r="0" g="0" b="0"/>
+          </a:effectRef>
+          <a:fontRef idx="none"/>
+        </p:style>
+      </p:cxnSp>
+      <p:sp>
+        <p:nvSpPr>
+          <p:cNvPr id="16" name="Text Placeholder 3">
+            <a:extLst>
+              <a:ext uri="{FF2B5EF4-FFF2-40B4-BE49-F238E27FC236}">
+                <a16:creationId xmlns:a16="http://schemas.microsoft.com/office/drawing/2014/main" id="{51AD875C-12A0-D738-4D12-B05AFA32502B}"/>
+              </a:ext>
+            </a:extLst>
+          </p:cNvPr>
+          <p:cNvSpPr txBox="1">
+            <a:spLocks/>
+          </p:cNvSpPr>
+          <p:nvPr/>
+        </p:nvSpPr>
+        <p:spPr>
+          <a:xfrm>
+            <a:off x="5046462" y="9955919"/>
+            <a:ext cx="8010516" cy="3399863"/>
+          </a:xfrm>
+          <a:prstGeom prst="rect">
+            <a:avLst/>
+          </a:prstGeom>
+          <a:ln w="12700">
+            <a:miter lim="400000"/>
+          </a:ln>
+          <a:extLst>
+            <a:ext uri="{C572A759-6A51-4108-AA02-DFA0A04FC94B}">
+              <ma14:wrappingTextBoxFlag xmlns="" xmlns:m="http://schemas.openxmlformats.org/officeDocument/2006/math" xmlns:a14="http://schemas.microsoft.com/office/drawing/2010/main" xmlns:ma14="http://schemas.microsoft.com/office/mac/drawingml/2011/main" val="1"/>
+            </a:ext>
+          </a:extLst>
+        </p:spPr>
+        <p:txBody>
+          <a:bodyPr lIns="50800" tIns="50800" rIns="50800" bIns="50800">
+            <a:normAutofit lnSpcReduction="10000"/>
+          </a:bodyPr>
+          <a:lstStyle>
+            <a:lvl1pPr marL="0" marR="0" indent="0" algn="l" defTabSz="825500" rtl="0" latinLnBrk="0">
+              <a:lnSpc>
+                <a:spcPct val="140000"/>
+              </a:lnSpc>
+              <a:spcBef>
+                <a:spcPts val="0"/>
+              </a:spcBef>
+              <a:spcAft>
+                <a:spcPts val="0"/>
+              </a:spcAft>
+              <a:buClrTx/>
+              <a:buSzTx/>
+              <a:buFontTx/>
+              <a:buNone/>
+              <a:tabLst/>
+              <a:defRPr sz="5400" b="1" i="0" u="none" strike="noStrike" cap="none" spc="-53" baseline="0">
+                <a:solidFill>
+                  <a:srgbClr val="000000"/>
+                </a:solidFill>
+                <a:uFillTx/>
+                <a:latin typeface="Proxima Nova"/>
+                <a:ea typeface="Proxima Nova"/>
+                <a:cs typeface="Proxima Nova"/>
+                <a:sym typeface="Proxima Nova"/>
+              </a:defRPr>
+            </a:lvl1pPr>
+            <a:lvl2pPr marL="0" marR="0" indent="457200" algn="l" defTabSz="825500" rtl="0" latinLnBrk="0">
+              <a:lnSpc>
+                <a:spcPct val="140000"/>
+              </a:lnSpc>
+              <a:spcBef>
+                <a:spcPts val="0"/>
+              </a:spcBef>
+              <a:spcAft>
+                <a:spcPts val="0"/>
+              </a:spcAft>
+              <a:buClrTx/>
+              <a:buSzTx/>
+              <a:buFontTx/>
+              <a:buNone/>
+              <a:tabLst/>
+              <a:defRPr sz="5400" b="1" i="0" u="none" strike="noStrike" cap="none" spc="-53" baseline="0">
+                <a:solidFill>
+                  <a:srgbClr val="000000"/>
+                </a:solidFill>
+                <a:uFillTx/>
+                <a:latin typeface="Proxima Nova"/>
+                <a:ea typeface="Proxima Nova"/>
+                <a:cs typeface="Proxima Nova"/>
+                <a:sym typeface="Proxima Nova"/>
+              </a:defRPr>
+            </a:lvl2pPr>
+            <a:lvl3pPr marL="0" marR="0" indent="914400" algn="l" defTabSz="825500" rtl="0" latinLnBrk="0">
+              <a:lnSpc>
+                <a:spcPct val="140000"/>
+              </a:lnSpc>
+              <a:spcBef>
+                <a:spcPts val="0"/>
+              </a:spcBef>
+              <a:spcAft>
+                <a:spcPts val="0"/>
+              </a:spcAft>
+              <a:buClrTx/>
+              <a:buSzTx/>
+              <a:buFontTx/>
+              <a:buNone/>
+              <a:tabLst/>
+              <a:defRPr sz="5400" b="1" i="0" u="none" strike="noStrike" cap="none" spc="-53" baseline="0">
+                <a:solidFill>
+                  <a:srgbClr val="000000"/>
+                </a:solidFill>
+                <a:uFillTx/>
+                <a:latin typeface="Proxima Nova"/>
+                <a:ea typeface="Proxima Nova"/>
+                <a:cs typeface="Proxima Nova"/>
+                <a:sym typeface="Proxima Nova"/>
+              </a:defRPr>
+            </a:lvl3pPr>
+            <a:lvl4pPr marL="0" marR="0" indent="1371600" algn="l" defTabSz="825500" rtl="0" latinLnBrk="0">
+              <a:lnSpc>
+                <a:spcPct val="140000"/>
+              </a:lnSpc>
+              <a:spcBef>
+                <a:spcPts val="0"/>
+              </a:spcBef>
+              <a:spcAft>
+                <a:spcPts val="0"/>
+              </a:spcAft>
+              <a:buClrTx/>
+              <a:buSzTx/>
+              <a:buFontTx/>
+              <a:buNone/>
+              <a:tabLst/>
+              <a:defRPr sz="5400" b="1" i="0" u="none" strike="noStrike" cap="none" spc="-53" baseline="0">
+                <a:solidFill>
+                  <a:srgbClr val="000000"/>
+                </a:solidFill>
+                <a:uFillTx/>
+                <a:latin typeface="Proxima Nova"/>
+                <a:ea typeface="Proxima Nova"/>
+                <a:cs typeface="Proxima Nova"/>
+                <a:sym typeface="Proxima Nova"/>
+              </a:defRPr>
+            </a:lvl4pPr>
+            <a:lvl5pPr marL="0" marR="0" indent="1828800" algn="l" defTabSz="825500" rtl="0" latinLnBrk="0">
+              <a:lnSpc>
+                <a:spcPct val="140000"/>
+              </a:lnSpc>
+              <a:spcBef>
+                <a:spcPts val="0"/>
+              </a:spcBef>
+              <a:spcAft>
+                <a:spcPts val="0"/>
+              </a:spcAft>
+              <a:buClrTx/>
+              <a:buSzTx/>
+              <a:buFontTx/>
+              <a:buNone/>
+              <a:tabLst/>
+              <a:defRPr sz="5400" b="1" i="0" u="none" strike="noStrike" cap="none" spc="-53" baseline="0">
+                <a:solidFill>
+                  <a:srgbClr val="000000"/>
+                </a:solidFill>
+                <a:uFillTx/>
+                <a:latin typeface="Proxima Nova"/>
+                <a:ea typeface="Proxima Nova"/>
+                <a:cs typeface="Proxima Nova"/>
+                <a:sym typeface="Proxima Nova"/>
+              </a:defRPr>
+            </a:lvl5pPr>
+            <a:lvl6pPr marL="4114800" marR="0" indent="-685800" algn="l" defTabSz="584200" rtl="0" latinLnBrk="0">
+              <a:lnSpc>
+                <a:spcPct val="80000"/>
+              </a:lnSpc>
+              <a:spcBef>
+                <a:spcPts val="2400"/>
+              </a:spcBef>
+              <a:spcAft>
+                <a:spcPts val="0"/>
+              </a:spcAft>
+              <a:buClr>
+                <a:srgbClr val="57BEF0"/>
+              </a:buClr>
+              <a:buSzPct val="250000"/>
+              <a:buFontTx/>
+              <a:buChar char="-"/>
+              <a:tabLst/>
+              <a:defRPr sz="4200" b="1" i="0" u="none" strike="noStrike" cap="none" spc="0" baseline="0">
+                <a:solidFill>
+                  <a:srgbClr val="53585F"/>
+                </a:solidFill>
+                <a:uFillTx/>
+                <a:latin typeface="Proxima Nova"/>
+                <a:ea typeface="Proxima Nova"/>
+                <a:cs typeface="Proxima Nova"/>
+                <a:sym typeface="Proxima Nova"/>
+              </a:defRPr>
+            </a:lvl6pPr>
+            <a:lvl7pPr marL="4800600" marR="0" indent="-685800" algn="l" defTabSz="584200" rtl="0" latinLnBrk="0">
+              <a:lnSpc>
+                <a:spcPct val="80000"/>
+              </a:lnSpc>
+              <a:spcBef>
+                <a:spcPts val="2400"/>
+              </a:spcBef>
+              <a:spcAft>
+                <a:spcPts val="0"/>
+              </a:spcAft>
+              <a:buClr>
+                <a:srgbClr val="57BEF0"/>
+              </a:buClr>
+              <a:buSzPct val="250000"/>
+              <a:buFontTx/>
+              <a:buChar char="-"/>
+              <a:tabLst/>
+              <a:defRPr sz="4200" b="1" i="0" u="none" strike="noStrike" cap="none" spc="0" baseline="0">
+                <a:solidFill>
+                  <a:srgbClr val="53585F"/>
+                </a:solidFill>
+                <a:uFillTx/>
+                <a:latin typeface="Proxima Nova"/>
+                <a:ea typeface="Proxima Nova"/>
+                <a:cs typeface="Proxima Nova"/>
+                <a:sym typeface="Proxima Nova"/>
+              </a:defRPr>
+            </a:lvl7pPr>
+            <a:lvl8pPr marL="5486400" marR="0" indent="-685800" algn="l" defTabSz="584200" rtl="0" latinLnBrk="0">
+              <a:lnSpc>
+                <a:spcPct val="80000"/>
+              </a:lnSpc>
+              <a:spcBef>
+                <a:spcPts val="2400"/>
+              </a:spcBef>
+              <a:spcAft>
+                <a:spcPts val="0"/>
+              </a:spcAft>
+              <a:buClr>
+                <a:srgbClr val="57BEF0"/>
+              </a:buClr>
+              <a:buSzPct val="250000"/>
+              <a:buFontTx/>
+              <a:buChar char="-"/>
+              <a:tabLst/>
+              <a:defRPr sz="4200" b="1" i="0" u="none" strike="noStrike" cap="none" spc="0" baseline="0">
+                <a:solidFill>
+                  <a:srgbClr val="53585F"/>
+                </a:solidFill>
+                <a:uFillTx/>
+                <a:latin typeface="Proxima Nova"/>
+                <a:ea typeface="Proxima Nova"/>
+                <a:cs typeface="Proxima Nova"/>
+                <a:sym typeface="Proxima Nova"/>
+              </a:defRPr>
+            </a:lvl8pPr>
+            <a:lvl9pPr marL="6172200" marR="0" indent="-685800" algn="l" defTabSz="584200" rtl="0" latinLnBrk="0">
+              <a:lnSpc>
+                <a:spcPct val="80000"/>
+              </a:lnSpc>
+              <a:spcBef>
+                <a:spcPts val="2400"/>
+              </a:spcBef>
+              <a:spcAft>
+                <a:spcPts val="0"/>
+              </a:spcAft>
+              <a:buClr>
+                <a:srgbClr val="57BEF0"/>
+              </a:buClr>
+              <a:buSzPct val="250000"/>
+              <a:buFontTx/>
+              <a:buChar char="-"/>
+              <a:tabLst/>
+              <a:defRPr sz="4200" b="1" i="0" u="none" strike="noStrike" cap="none" spc="0" baseline="0">
+                <a:solidFill>
+                  <a:srgbClr val="53585F"/>
+                </a:solidFill>
+                <a:uFillTx/>
+                <a:latin typeface="Proxima Nova"/>
+                <a:ea typeface="Proxima Nova"/>
+                <a:cs typeface="Proxima Nova"/>
+                <a:sym typeface="Proxima Nova"/>
+              </a:defRPr>
+            </a:lvl9pPr>
+          </a:lstStyle>
+          <a:p>
+            <a:pPr algn="ctr" hangingPunct="1"/>
+            <a:r>
+              <a:rPr lang="en-US" dirty="0">
+                <a:solidFill>
+                  <a:srgbClr val="FFFFFF"/>
+                </a:solidFill>
+              </a:rPr>
+              <a:t>Tractable:</a:t>
+            </a:r>
+          </a:p>
+          <a:p>
+            <a:pPr algn="ctr" hangingPunct="1"/>
+            <a:r>
+              <a:rPr lang="en-US" dirty="0">
+                <a:solidFill>
+                  <a:srgbClr val="FFFFFF"/>
+                </a:solidFill>
+              </a:rPr>
+              <a:t>Polynomial or </a:t>
+            </a:r>
+          </a:p>
+          <a:p>
+            <a:pPr algn="ctr" hangingPunct="1"/>
+            <a:r>
+              <a:rPr lang="en-US" dirty="0">
+                <a:solidFill>
+                  <a:srgbClr val="FFFFFF"/>
+                </a:solidFill>
+              </a:rPr>
+              <a:t>Less Solution</a:t>
+            </a:r>
+          </a:p>
+        </p:txBody>
+      </p:sp>
+      <p:sp>
+        <p:nvSpPr>
+          <p:cNvPr id="18" name="Text Placeholder 3">
+            <a:extLst>
+              <a:ext uri="{FF2B5EF4-FFF2-40B4-BE49-F238E27FC236}">
+                <a16:creationId xmlns:a16="http://schemas.microsoft.com/office/drawing/2014/main" id="{0EEADA4F-A17F-BE61-B0D4-167DF52A4CBD}"/>
+              </a:ext>
+            </a:extLst>
+          </p:cNvPr>
+          <p:cNvSpPr txBox="1">
+            <a:spLocks/>
+          </p:cNvSpPr>
+          <p:nvPr/>
+        </p:nvSpPr>
+        <p:spPr>
+          <a:xfrm>
+            <a:off x="16498164" y="9955918"/>
+            <a:ext cx="8010516" cy="3399863"/>
+          </a:xfrm>
+          <a:prstGeom prst="rect">
+            <a:avLst/>
+          </a:prstGeom>
+          <a:ln w="12700">
+            <a:miter lim="400000"/>
+          </a:ln>
+          <a:extLst>
+            <a:ext uri="{C572A759-6A51-4108-AA02-DFA0A04FC94B}">
+              <ma14:wrappingTextBoxFlag xmlns="" xmlns:m="http://schemas.openxmlformats.org/officeDocument/2006/math" xmlns:a14="http://schemas.microsoft.com/office/drawing/2010/main" xmlns:ma14="http://schemas.microsoft.com/office/mac/drawingml/2011/main" val="1"/>
+            </a:ext>
+          </a:extLst>
+        </p:spPr>
+        <p:txBody>
+          <a:bodyPr lIns="50800" tIns="50800" rIns="50800" bIns="50800">
+            <a:normAutofit lnSpcReduction="10000"/>
+          </a:bodyPr>
+          <a:lstStyle>
+            <a:lvl1pPr marL="0" marR="0" indent="0" algn="l" defTabSz="825500" rtl="0" latinLnBrk="0">
+              <a:lnSpc>
+                <a:spcPct val="140000"/>
+              </a:lnSpc>
+              <a:spcBef>
+                <a:spcPts val="0"/>
+              </a:spcBef>
+              <a:spcAft>
+                <a:spcPts val="0"/>
+              </a:spcAft>
+              <a:buClrTx/>
+              <a:buSzTx/>
+              <a:buFontTx/>
+              <a:buNone/>
+              <a:tabLst/>
+              <a:defRPr sz="5400" b="1" i="0" u="none" strike="noStrike" cap="none" spc="-53" baseline="0">
+                <a:solidFill>
+                  <a:srgbClr val="000000"/>
+                </a:solidFill>
+                <a:uFillTx/>
+                <a:latin typeface="Proxima Nova"/>
+                <a:ea typeface="Proxima Nova"/>
+                <a:cs typeface="Proxima Nova"/>
+                <a:sym typeface="Proxima Nova"/>
+              </a:defRPr>
+            </a:lvl1pPr>
+            <a:lvl2pPr marL="0" marR="0" indent="457200" algn="l" defTabSz="825500" rtl="0" latinLnBrk="0">
+              <a:lnSpc>
+                <a:spcPct val="140000"/>
+              </a:lnSpc>
+              <a:spcBef>
+                <a:spcPts val="0"/>
+              </a:spcBef>
+              <a:spcAft>
+                <a:spcPts val="0"/>
+              </a:spcAft>
+              <a:buClrTx/>
+              <a:buSzTx/>
+              <a:buFontTx/>
+              <a:buNone/>
+              <a:tabLst/>
+              <a:defRPr sz="5400" b="1" i="0" u="none" strike="noStrike" cap="none" spc="-53" baseline="0">
+                <a:solidFill>
+                  <a:srgbClr val="000000"/>
+                </a:solidFill>
+                <a:uFillTx/>
+                <a:latin typeface="Proxima Nova"/>
+                <a:ea typeface="Proxima Nova"/>
+                <a:cs typeface="Proxima Nova"/>
+                <a:sym typeface="Proxima Nova"/>
+              </a:defRPr>
+            </a:lvl2pPr>
+            <a:lvl3pPr marL="0" marR="0" indent="914400" algn="l" defTabSz="825500" rtl="0" latinLnBrk="0">
+              <a:lnSpc>
+                <a:spcPct val="140000"/>
+              </a:lnSpc>
+              <a:spcBef>
+                <a:spcPts val="0"/>
+              </a:spcBef>
+              <a:spcAft>
+                <a:spcPts val="0"/>
+              </a:spcAft>
+              <a:buClrTx/>
+              <a:buSzTx/>
+              <a:buFontTx/>
+              <a:buNone/>
+              <a:tabLst/>
+              <a:defRPr sz="5400" b="1" i="0" u="none" strike="noStrike" cap="none" spc="-53" baseline="0">
+                <a:solidFill>
+                  <a:srgbClr val="000000"/>
+                </a:solidFill>
+                <a:uFillTx/>
+                <a:latin typeface="Proxima Nova"/>
+                <a:ea typeface="Proxima Nova"/>
+                <a:cs typeface="Proxima Nova"/>
+                <a:sym typeface="Proxima Nova"/>
+              </a:defRPr>
+            </a:lvl3pPr>
+            <a:lvl4pPr marL="0" marR="0" indent="1371600" algn="l" defTabSz="825500" rtl="0" latinLnBrk="0">
+              <a:lnSpc>
+                <a:spcPct val="140000"/>
+              </a:lnSpc>
+              <a:spcBef>
+                <a:spcPts val="0"/>
+              </a:spcBef>
+              <a:spcAft>
+                <a:spcPts val="0"/>
+              </a:spcAft>
+              <a:buClrTx/>
+              <a:buSzTx/>
+              <a:buFontTx/>
+              <a:buNone/>
+              <a:tabLst/>
+              <a:defRPr sz="5400" b="1" i="0" u="none" strike="noStrike" cap="none" spc="-53" baseline="0">
+                <a:solidFill>
+                  <a:srgbClr val="000000"/>
+                </a:solidFill>
+                <a:uFillTx/>
+                <a:latin typeface="Proxima Nova"/>
+                <a:ea typeface="Proxima Nova"/>
+                <a:cs typeface="Proxima Nova"/>
+                <a:sym typeface="Proxima Nova"/>
+              </a:defRPr>
+            </a:lvl4pPr>
+            <a:lvl5pPr marL="0" marR="0" indent="1828800" algn="l" defTabSz="825500" rtl="0" latinLnBrk="0">
+              <a:lnSpc>
+                <a:spcPct val="140000"/>
+              </a:lnSpc>
+              <a:spcBef>
+                <a:spcPts val="0"/>
+              </a:spcBef>
+              <a:spcAft>
+                <a:spcPts val="0"/>
+              </a:spcAft>
+              <a:buClrTx/>
+              <a:buSzTx/>
+              <a:buFontTx/>
+              <a:buNone/>
+              <a:tabLst/>
+              <a:defRPr sz="5400" b="1" i="0" u="none" strike="noStrike" cap="none" spc="-53" baseline="0">
+                <a:solidFill>
+                  <a:srgbClr val="000000"/>
+                </a:solidFill>
+                <a:uFillTx/>
+                <a:latin typeface="Proxima Nova"/>
+                <a:ea typeface="Proxima Nova"/>
+                <a:cs typeface="Proxima Nova"/>
+                <a:sym typeface="Proxima Nova"/>
+              </a:defRPr>
+            </a:lvl5pPr>
+            <a:lvl6pPr marL="4114800" marR="0" indent="-685800" algn="l" defTabSz="584200" rtl="0" latinLnBrk="0">
+              <a:lnSpc>
+                <a:spcPct val="80000"/>
+              </a:lnSpc>
+              <a:spcBef>
+                <a:spcPts val="2400"/>
+              </a:spcBef>
+              <a:spcAft>
+                <a:spcPts val="0"/>
+              </a:spcAft>
+              <a:buClr>
+                <a:srgbClr val="57BEF0"/>
+              </a:buClr>
+              <a:buSzPct val="250000"/>
+              <a:buFontTx/>
+              <a:buChar char="-"/>
+              <a:tabLst/>
+              <a:defRPr sz="4200" b="1" i="0" u="none" strike="noStrike" cap="none" spc="0" baseline="0">
+                <a:solidFill>
+                  <a:srgbClr val="53585F"/>
+                </a:solidFill>
+                <a:uFillTx/>
+                <a:latin typeface="Proxima Nova"/>
+                <a:ea typeface="Proxima Nova"/>
+                <a:cs typeface="Proxima Nova"/>
+                <a:sym typeface="Proxima Nova"/>
+              </a:defRPr>
+            </a:lvl6pPr>
+            <a:lvl7pPr marL="4800600" marR="0" indent="-685800" algn="l" defTabSz="584200" rtl="0" latinLnBrk="0">
+              <a:lnSpc>
+                <a:spcPct val="80000"/>
+              </a:lnSpc>
+              <a:spcBef>
+                <a:spcPts val="2400"/>
+              </a:spcBef>
+              <a:spcAft>
+                <a:spcPts val="0"/>
+              </a:spcAft>
+              <a:buClr>
+                <a:srgbClr val="57BEF0"/>
+              </a:buClr>
+              <a:buSzPct val="250000"/>
+              <a:buFontTx/>
+              <a:buChar char="-"/>
+              <a:tabLst/>
+              <a:defRPr sz="4200" b="1" i="0" u="none" strike="noStrike" cap="none" spc="0" baseline="0">
+                <a:solidFill>
+                  <a:srgbClr val="53585F"/>
+                </a:solidFill>
+                <a:uFillTx/>
+                <a:latin typeface="Proxima Nova"/>
+                <a:ea typeface="Proxima Nova"/>
+                <a:cs typeface="Proxima Nova"/>
+                <a:sym typeface="Proxima Nova"/>
+              </a:defRPr>
+            </a:lvl7pPr>
+            <a:lvl8pPr marL="5486400" marR="0" indent="-685800" algn="l" defTabSz="584200" rtl="0" latinLnBrk="0">
+              <a:lnSpc>
+                <a:spcPct val="80000"/>
+              </a:lnSpc>
+              <a:spcBef>
+                <a:spcPts val="2400"/>
+              </a:spcBef>
+              <a:spcAft>
+                <a:spcPts val="0"/>
+              </a:spcAft>
+              <a:buClr>
+                <a:srgbClr val="57BEF0"/>
+              </a:buClr>
+              <a:buSzPct val="250000"/>
+              <a:buFontTx/>
+              <a:buChar char="-"/>
+              <a:tabLst/>
+              <a:defRPr sz="4200" b="1" i="0" u="none" strike="noStrike" cap="none" spc="0" baseline="0">
+                <a:solidFill>
+                  <a:srgbClr val="53585F"/>
+                </a:solidFill>
+                <a:uFillTx/>
+                <a:latin typeface="Proxima Nova"/>
+                <a:ea typeface="Proxima Nova"/>
+                <a:cs typeface="Proxima Nova"/>
+                <a:sym typeface="Proxima Nova"/>
+              </a:defRPr>
+            </a:lvl8pPr>
+            <a:lvl9pPr marL="6172200" marR="0" indent="-685800" algn="l" defTabSz="584200" rtl="0" latinLnBrk="0">
+              <a:lnSpc>
+                <a:spcPct val="80000"/>
+              </a:lnSpc>
+              <a:spcBef>
+                <a:spcPts val="2400"/>
+              </a:spcBef>
+              <a:spcAft>
+                <a:spcPts val="0"/>
+              </a:spcAft>
+              <a:buClr>
+                <a:srgbClr val="57BEF0"/>
+              </a:buClr>
+              <a:buSzPct val="250000"/>
+              <a:buFontTx/>
+              <a:buChar char="-"/>
+              <a:tabLst/>
+              <a:defRPr sz="4200" b="1" i="0" u="none" strike="noStrike" cap="none" spc="0" baseline="0">
+                <a:solidFill>
+                  <a:srgbClr val="53585F"/>
+                </a:solidFill>
+                <a:uFillTx/>
+                <a:latin typeface="Proxima Nova"/>
+                <a:ea typeface="Proxima Nova"/>
+                <a:cs typeface="Proxima Nova"/>
+                <a:sym typeface="Proxima Nova"/>
+              </a:defRPr>
+            </a:lvl9pPr>
+          </a:lstStyle>
+          <a:p>
+            <a:pPr algn="ctr" hangingPunct="1"/>
+            <a:r>
+              <a:rPr lang="en-US" dirty="0">
+                <a:solidFill>
+                  <a:srgbClr val="FFFFFF"/>
+                </a:solidFill>
+              </a:rPr>
+              <a:t>Intractable:</a:t>
+            </a:r>
+          </a:p>
+          <a:p>
+            <a:pPr algn="ctr" hangingPunct="1"/>
+            <a:r>
+              <a:rPr lang="en-US" dirty="0">
+                <a:solidFill>
+                  <a:srgbClr val="FFFFFF"/>
+                </a:solidFill>
+              </a:rPr>
+              <a:t>NO Polynomial or </a:t>
+            </a:r>
+          </a:p>
+          <a:p>
+            <a:pPr algn="ctr" hangingPunct="1"/>
+            <a:r>
+              <a:rPr lang="en-US" dirty="0">
+                <a:solidFill>
+                  <a:srgbClr val="FFFFFF"/>
+                </a:solidFill>
+              </a:rPr>
+              <a:t>Less Solution</a:t>
+            </a:r>
+          </a:p>
+        </p:txBody>
+      </p:sp>
+    </p:spTree>
+    <p:extLst>
+      <p:ext uri="{BB962C8B-B14F-4D97-AF65-F5344CB8AC3E}">
+        <p14:creationId xmlns:p14="http://schemas.microsoft.com/office/powerpoint/2010/main" val="615036470"/>
+      </p:ext>
+    </p:extLst>
+  </p:cSld>
+  <p:clrMapOvr>
+    <a:masterClrMapping/>
+  </p:clrMapOvr>
+  <p:transition spd="med"/>
+</p:sld>
+</file>
+
+<file path=ppt/slides/slide16.xml><?xml version="1.0" encoding="utf-8"?>
+<p:sld xmlns:a="http://schemas.openxmlformats.org/drawingml/2006/main" xmlns:r="http://schemas.openxmlformats.org/officeDocument/2006/relationships" xmlns:p="http://schemas.openxmlformats.org/presentationml/2006/main">
+  <p:cSld>
+    <p:spTree>
+      <p:nvGrpSpPr>
+        <p:cNvPr id="1" name=""/>
+        <p:cNvGrpSpPr/>
+        <p:nvPr/>
+      </p:nvGrpSpPr>
+      <p:grpSpPr>
+        <a:xfrm>
+          <a:off x="0" y="0"/>
+          <a:ext cx="0" cy="0"/>
+          <a:chOff x="0" y="0"/>
+          <a:chExt cx="0" cy="0"/>
+        </a:xfrm>
+      </p:grpSpPr>
+      <p:sp>
+        <p:nvSpPr>
+          <p:cNvPr id="213" name="Your exam"/>
+          <p:cNvSpPr txBox="1">
+            <a:spLocks noGrp="1"/>
+          </p:cNvSpPr>
+          <p:nvPr>
+            <p:ph type="title"/>
+          </p:nvPr>
+        </p:nvSpPr>
+        <p:spPr>
+          <a:prstGeom prst="rect">
+            <a:avLst/>
+          </a:prstGeom>
+        </p:spPr>
+        <p:txBody>
+          <a:bodyPr/>
+          <a:lstStyle/>
+          <a:p>
+            <a:r>
+              <a:rPr lang="en-GB" b="1" dirty="0"/>
+              <a:t>Computational problems</a:t>
+            </a:r>
+            <a:endParaRPr b="1" dirty="0"/>
+          </a:p>
+        </p:txBody>
+      </p:sp>
+      <p:sp>
+        <p:nvSpPr>
+          <p:cNvPr id="3" name="Text Placeholder 2">
+            <a:extLst>
+              <a:ext uri="{FF2B5EF4-FFF2-40B4-BE49-F238E27FC236}">
+                <a16:creationId xmlns:a16="http://schemas.microsoft.com/office/drawing/2014/main" id="{2CBA9DE5-9EAE-A36C-8AE7-50D4845B518B}"/>
+              </a:ext>
+            </a:extLst>
+          </p:cNvPr>
+          <p:cNvSpPr>
+            <a:spLocks noGrp="1"/>
+          </p:cNvSpPr>
+          <p:nvPr>
+            <p:ph type="body" idx="1"/>
+          </p:nvPr>
+        </p:nvSpPr>
+        <p:spPr/>
+        <p:txBody>
+          <a:bodyPr>
+            <a:normAutofit/>
+          </a:bodyPr>
+          <a:lstStyle/>
+          <a:p>
+            <a:r>
+              <a:rPr lang="en-US" dirty="0">
+                <a:latin typeface="Avenir Next" panose="020B0503020202020204" pitchFamily="34" charset="0"/>
+              </a:rPr>
+              <a:t>Not every problem can be solved with an algorithm.</a:t>
+            </a:r>
+          </a:p>
+          <a:p>
+            <a:r>
+              <a:rPr lang="en-US" dirty="0">
+                <a:latin typeface="Avenir Next" panose="020B0503020202020204" pitchFamily="34" charset="0"/>
+              </a:rPr>
+              <a:t>These problems we call non-computable.</a:t>
+            </a:r>
+          </a:p>
+        </p:txBody>
+      </p:sp>
+    </p:spTree>
+    <p:extLst>
+      <p:ext uri="{BB962C8B-B14F-4D97-AF65-F5344CB8AC3E}">
+        <p14:creationId xmlns:p14="http://schemas.microsoft.com/office/powerpoint/2010/main" val="2070553688"/>
+      </p:ext>
+    </p:extLst>
+  </p:cSld>
+  <p:clrMapOvr>
+    <a:masterClrMapping/>
+  </p:clrMapOvr>
+  <p:transition spd="med"/>
+  <p:timing>
+    <p:tnLst>
+      <p:par>
+        <p:cTn id="1" dur="indefinite" restart="never" nodeType="tmRoot">
+          <p:childTnLst>
+            <p:seq concurrent="1" nextAc="seek">
+              <p:cTn id="2" dur="indefinite" nodeType="mainSeq">
+                <p:childTnLst>
+                  <p:par>
+                    <p:cTn id="3" fill="hold">
+                      <p:stCondLst>
+                        <p:cond delay="indefinite"/>
+                      </p:stCondLst>
+                      <p:childTnLst>
+                        <p:par>
+                          <p:cTn id="4" fill="hold">
+                            <p:stCondLst>
+                              <p:cond delay="0"/>
+                            </p:stCondLst>
+                            <p:childTnLst>
+                              <p:par>
+                                <p:cTn id="5" presetID="1" presetClass="entr" presetSubtype="0" fill="hold" grpId="0" nodeType="clickEffect">
+                                  <p:stCondLst>
+                                    <p:cond delay="0"/>
+                                  </p:stCondLst>
+                                  <p:childTnLst>
+                                    <p:set>
+                                      <p:cBhvr>
+                                        <p:cTn id="6" dur="1" fill="hold">
+                                          <p:stCondLst>
+                                            <p:cond delay="0"/>
+                                          </p:stCondLst>
+                                        </p:cTn>
+                                        <p:tgtEl>
+                                          <p:spTgt spid="3">
+                                            <p:txEl>
+                                              <p:pRg st="0" end="0"/>
+                                            </p:txEl>
+                                          </p:spTgt>
+                                        </p:tgtEl>
+                                        <p:attrNameLst>
+                                          <p:attrName>style.visibility</p:attrName>
+                                        </p:attrNameLst>
+                                      </p:cBhvr>
+                                      <p:to>
+                                        <p:strVal val="visible"/>
+                                      </p:to>
+                                    </p:set>
+                                  </p:childTnLst>
+                                </p:cTn>
+                              </p:par>
+                            </p:childTnLst>
+                          </p:cTn>
+                        </p:par>
+                      </p:childTnLst>
+                    </p:cTn>
+                  </p:par>
+                  <p:par>
+                    <p:cTn id="7" fill="hold">
+                      <p:stCondLst>
+                        <p:cond delay="indefinite"/>
+                      </p:stCondLst>
+                      <p:childTnLst>
+                        <p:par>
+                          <p:cTn id="8" fill="hold">
+                            <p:stCondLst>
+                              <p:cond delay="0"/>
+                            </p:stCondLst>
+                            <p:childTnLst>
+                              <p:par>
+                                <p:cTn id="9" presetID="1" presetClass="entr" presetSubtype="0" fill="hold" grpId="0" nodeType="clickEffect">
+                                  <p:stCondLst>
+                                    <p:cond delay="0"/>
+                                  </p:stCondLst>
+                                  <p:childTnLst>
+                                    <p:set>
+                                      <p:cBhvr>
+                                        <p:cTn id="10" dur="1" fill="hold">
+                                          <p:stCondLst>
+                                            <p:cond delay="0"/>
+                                          </p:stCondLst>
+                                        </p:cTn>
+                                        <p:tgtEl>
+                                          <p:spTgt spid="3">
+                                            <p:txEl>
+                                              <p:pRg st="1" end="1"/>
+                                            </p:txEl>
+                                          </p:spTgt>
+                                        </p:tgtEl>
+                                        <p:attrNameLst>
+                                          <p:attrName>style.visibility</p:attrName>
+                                        </p:attrNameLst>
+                                      </p:cBhvr>
+                                      <p:to>
+                                        <p:strVal val="visible"/>
+                                      </p:to>
+                                    </p:set>
+                                  </p:childTnLst>
+                                </p:cTn>
+                              </p:par>
+                            </p:childTnLst>
+                          </p:cTn>
+                        </p:par>
+                      </p:childTnLst>
+                    </p:cTn>
+                  </p:par>
+                </p:childTnLst>
+              </p:cTn>
+              <p:prevCondLst>
+                <p:cond evt="onPrev" delay="0">
+                  <p:tgtEl>
+                    <p:sldTgt/>
+                  </p:tgtEl>
+                </p:cond>
+              </p:prevCondLst>
+              <p:nextCondLst>
+                <p:cond evt="onNext" delay="0">
+                  <p:tgtEl>
+                    <p:sldTgt/>
+                  </p:tgtEl>
+                </p:cond>
+              </p:nextCondLst>
+            </p:seq>
+          </p:childTnLst>
+        </p:cTn>
+      </p:par>
+    </p:tnLst>
+    <p:bldLst>
+      <p:bldP spid="3" grpId="0" uiExpand="1" build="p"/>
+    </p:bldLst>
+  </p:timing>
+</p:sld>
+</file>
+
+<file path=ppt/slides/slide17.xml><?xml version="1.0" encoding="utf-8"?>
+<p:sld xmlns:a="http://schemas.openxmlformats.org/drawingml/2006/main" xmlns:r="http://schemas.openxmlformats.org/officeDocument/2006/relationships" xmlns:p="http://schemas.openxmlformats.org/presentationml/2006/main">
+  <p:cSld>
+    <p:spTree>
+      <p:nvGrpSpPr>
+        <p:cNvPr id="1" name=""/>
+        <p:cNvGrpSpPr/>
+        <p:nvPr/>
+      </p:nvGrpSpPr>
+      <p:grpSpPr>
+        <a:xfrm>
+          <a:off x="0" y="0"/>
+          <a:ext cx="0" cy="0"/>
+          <a:chOff x="0" y="0"/>
+          <a:chExt cx="0" cy="0"/>
+        </a:xfrm>
+      </p:grpSpPr>
+      <p:sp>
+        <p:nvSpPr>
+          <p:cNvPr id="4" name="Your exam">
+            <a:extLst>
+              <a:ext uri="{FF2B5EF4-FFF2-40B4-BE49-F238E27FC236}">
+                <a16:creationId xmlns:a16="http://schemas.microsoft.com/office/drawing/2014/main" id="{E6367FBE-6925-232B-A631-980F0C03D592}"/>
+              </a:ext>
+            </a:extLst>
+          </p:cNvPr>
+          <p:cNvSpPr txBox="1">
+            <a:spLocks/>
+          </p:cNvSpPr>
+          <p:nvPr/>
+        </p:nvSpPr>
+        <p:spPr>
+          <a:xfrm>
+            <a:off x="1219200" y="3906982"/>
+            <a:ext cx="21945600" cy="5902036"/>
+          </a:xfrm>
+          <a:prstGeom prst="rect">
+            <a:avLst/>
+          </a:prstGeom>
+        </p:spPr>
+        <p:txBody>
+          <a:bodyPr anchor="ctr">
+            <a:normAutofit/>
+          </a:bodyPr>
+          <a:lstStyle>
+            <a:lvl1pPr marL="0" marR="0" indent="0" algn="l" defTabSz="825500" rtl="0" latinLnBrk="0">
+              <a:lnSpc>
+                <a:spcPct val="80000"/>
+              </a:lnSpc>
+              <a:spcBef>
+                <a:spcPts val="0"/>
+              </a:spcBef>
+              <a:spcAft>
+                <a:spcPts val="0"/>
+              </a:spcAft>
+              <a:buClrTx/>
+              <a:buSzTx/>
+              <a:buFontTx/>
+              <a:buNone/>
+              <a:tabLst/>
+              <a:defRPr sz="11600" b="0" i="0" u="none" strike="noStrike" cap="all" spc="-116" baseline="0">
+                <a:solidFill>
+                  <a:srgbClr val="00BFF3"/>
+                </a:solidFill>
+                <a:uFillTx/>
+                <a:latin typeface="+mn-lt"/>
+                <a:ea typeface="+mn-ea"/>
+                <a:cs typeface="+mn-cs"/>
+                <a:sym typeface="Druk Medium"/>
+              </a:defRPr>
+            </a:lvl1pPr>
+            <a:lvl2pPr marL="0" marR="0" indent="457200" algn="l" defTabSz="825500" rtl="0" latinLnBrk="0">
+              <a:lnSpc>
+                <a:spcPct val="80000"/>
+              </a:lnSpc>
+              <a:spcBef>
+                <a:spcPts val="0"/>
+              </a:spcBef>
+              <a:spcAft>
+                <a:spcPts val="0"/>
+              </a:spcAft>
+              <a:buClrTx/>
+              <a:buSzTx/>
+              <a:buFontTx/>
+              <a:buNone/>
+              <a:tabLst/>
+              <a:defRPr sz="11600" b="0" i="0" u="none" strike="noStrike" cap="all" spc="-116" baseline="0">
+                <a:solidFill>
+                  <a:srgbClr val="00BFF3"/>
+                </a:solidFill>
+                <a:uFillTx/>
+                <a:latin typeface="+mn-lt"/>
+                <a:ea typeface="+mn-ea"/>
+                <a:cs typeface="+mn-cs"/>
+                <a:sym typeface="Druk Medium"/>
+              </a:defRPr>
+            </a:lvl2pPr>
+            <a:lvl3pPr marL="0" marR="0" indent="914400" algn="l" defTabSz="825500" rtl="0" latinLnBrk="0">
+              <a:lnSpc>
+                <a:spcPct val="80000"/>
+              </a:lnSpc>
+              <a:spcBef>
+                <a:spcPts val="0"/>
+              </a:spcBef>
+              <a:spcAft>
+                <a:spcPts val="0"/>
+              </a:spcAft>
+              <a:buClrTx/>
+              <a:buSzTx/>
+              <a:buFontTx/>
+              <a:buNone/>
+              <a:tabLst/>
+              <a:defRPr sz="11600" b="0" i="0" u="none" strike="noStrike" cap="all" spc="-116" baseline="0">
+                <a:solidFill>
+                  <a:srgbClr val="00BFF3"/>
+                </a:solidFill>
+                <a:uFillTx/>
+                <a:latin typeface="+mn-lt"/>
+                <a:ea typeface="+mn-ea"/>
+                <a:cs typeface="+mn-cs"/>
+                <a:sym typeface="Druk Medium"/>
+              </a:defRPr>
+            </a:lvl3pPr>
+            <a:lvl4pPr marL="0" marR="0" indent="1371600" algn="l" defTabSz="825500" rtl="0" latinLnBrk="0">
+              <a:lnSpc>
+                <a:spcPct val="80000"/>
+              </a:lnSpc>
+              <a:spcBef>
+                <a:spcPts val="0"/>
+              </a:spcBef>
+              <a:spcAft>
+                <a:spcPts val="0"/>
+              </a:spcAft>
+              <a:buClrTx/>
+              <a:buSzTx/>
+              <a:buFontTx/>
+              <a:buNone/>
+              <a:tabLst/>
+              <a:defRPr sz="11600" b="0" i="0" u="none" strike="noStrike" cap="all" spc="-116" baseline="0">
+                <a:solidFill>
+                  <a:srgbClr val="00BFF3"/>
+                </a:solidFill>
+                <a:uFillTx/>
+                <a:latin typeface="+mn-lt"/>
+                <a:ea typeface="+mn-ea"/>
+                <a:cs typeface="+mn-cs"/>
+                <a:sym typeface="Druk Medium"/>
+              </a:defRPr>
+            </a:lvl4pPr>
+            <a:lvl5pPr marL="0" marR="0" indent="1828800" algn="l" defTabSz="825500" rtl="0" latinLnBrk="0">
+              <a:lnSpc>
+                <a:spcPct val="80000"/>
+              </a:lnSpc>
+              <a:spcBef>
+                <a:spcPts val="0"/>
+              </a:spcBef>
+              <a:spcAft>
+                <a:spcPts val="0"/>
+              </a:spcAft>
+              <a:buClrTx/>
+              <a:buSzTx/>
+              <a:buFontTx/>
+              <a:buNone/>
+              <a:tabLst/>
+              <a:defRPr sz="11600" b="0" i="0" u="none" strike="noStrike" cap="all" spc="-116" baseline="0">
+                <a:solidFill>
+                  <a:srgbClr val="00BFF3"/>
+                </a:solidFill>
+                <a:uFillTx/>
+                <a:latin typeface="+mn-lt"/>
+                <a:ea typeface="+mn-ea"/>
+                <a:cs typeface="+mn-cs"/>
+                <a:sym typeface="Druk Medium"/>
+              </a:defRPr>
+            </a:lvl5pPr>
+            <a:lvl6pPr marL="0" marR="0" indent="2286000" algn="l" defTabSz="825500" rtl="0" latinLnBrk="0">
+              <a:lnSpc>
+                <a:spcPct val="80000"/>
+              </a:lnSpc>
+              <a:spcBef>
+                <a:spcPts val="0"/>
+              </a:spcBef>
+              <a:spcAft>
+                <a:spcPts val="0"/>
+              </a:spcAft>
+              <a:buClrTx/>
+              <a:buSzTx/>
+              <a:buFontTx/>
+              <a:buNone/>
+              <a:tabLst/>
+              <a:defRPr sz="11600" b="0" i="0" u="none" strike="noStrike" cap="all" spc="-116" baseline="0">
+                <a:solidFill>
+                  <a:srgbClr val="00BFF3"/>
+                </a:solidFill>
+                <a:uFillTx/>
+                <a:latin typeface="+mn-lt"/>
+                <a:ea typeface="+mn-ea"/>
+                <a:cs typeface="+mn-cs"/>
+                <a:sym typeface="Druk Medium"/>
+              </a:defRPr>
+            </a:lvl6pPr>
+            <a:lvl7pPr marL="0" marR="0" indent="2743200" algn="l" defTabSz="825500" rtl="0" latinLnBrk="0">
+              <a:lnSpc>
+                <a:spcPct val="80000"/>
+              </a:lnSpc>
+              <a:spcBef>
+                <a:spcPts val="0"/>
+              </a:spcBef>
+              <a:spcAft>
+                <a:spcPts val="0"/>
+              </a:spcAft>
+              <a:buClrTx/>
+              <a:buSzTx/>
+              <a:buFontTx/>
+              <a:buNone/>
+              <a:tabLst/>
+              <a:defRPr sz="11600" b="0" i="0" u="none" strike="noStrike" cap="all" spc="-116" baseline="0">
+                <a:solidFill>
+                  <a:srgbClr val="00BFF3"/>
+                </a:solidFill>
+                <a:uFillTx/>
+                <a:latin typeface="+mn-lt"/>
+                <a:ea typeface="+mn-ea"/>
+                <a:cs typeface="+mn-cs"/>
+                <a:sym typeface="Druk Medium"/>
+              </a:defRPr>
+            </a:lvl7pPr>
+            <a:lvl8pPr marL="0" marR="0" indent="3200400" algn="l" defTabSz="825500" rtl="0" latinLnBrk="0">
+              <a:lnSpc>
+                <a:spcPct val="80000"/>
+              </a:lnSpc>
+              <a:spcBef>
+                <a:spcPts val="0"/>
+              </a:spcBef>
+              <a:spcAft>
+                <a:spcPts val="0"/>
+              </a:spcAft>
+              <a:buClrTx/>
+              <a:buSzTx/>
+              <a:buFontTx/>
+              <a:buNone/>
+              <a:tabLst/>
+              <a:defRPr sz="11600" b="0" i="0" u="none" strike="noStrike" cap="all" spc="-116" baseline="0">
+                <a:solidFill>
+                  <a:srgbClr val="00BFF3"/>
+                </a:solidFill>
+                <a:uFillTx/>
+                <a:latin typeface="+mn-lt"/>
+                <a:ea typeface="+mn-ea"/>
+                <a:cs typeface="+mn-cs"/>
+                <a:sym typeface="Druk Medium"/>
+              </a:defRPr>
+            </a:lvl8pPr>
+            <a:lvl9pPr marL="0" marR="0" indent="3657600" algn="l" defTabSz="825500" rtl="0" latinLnBrk="0">
+              <a:lnSpc>
+                <a:spcPct val="80000"/>
+              </a:lnSpc>
+              <a:spcBef>
+                <a:spcPts val="0"/>
+              </a:spcBef>
+              <a:spcAft>
+                <a:spcPts val="0"/>
+              </a:spcAft>
+              <a:buClrTx/>
+              <a:buSzTx/>
+              <a:buFontTx/>
+              <a:buNone/>
+              <a:tabLst/>
+              <a:defRPr sz="11600" b="0" i="0" u="none" strike="noStrike" cap="all" spc="-116" baseline="0">
+                <a:solidFill>
+                  <a:srgbClr val="00BFF3"/>
+                </a:solidFill>
+                <a:uFillTx/>
+                <a:latin typeface="+mn-lt"/>
+                <a:ea typeface="+mn-ea"/>
+                <a:cs typeface="+mn-cs"/>
+                <a:sym typeface="Druk Medium"/>
+              </a:defRPr>
+            </a:lvl9pPr>
+          </a:lstStyle>
+          <a:p>
+            <a:pPr algn="ctr" hangingPunct="1"/>
+            <a:r>
+              <a:rPr lang="en-GB" sz="16700" b="1" dirty="0">
+                <a:solidFill>
+                  <a:srgbClr val="FFFFFF"/>
+                </a:solidFill>
+              </a:rPr>
+              <a:t>Your turn:</a:t>
+            </a:r>
+            <a:br>
+              <a:rPr lang="en-GB" sz="16700" b="1" dirty="0">
+                <a:solidFill>
+                  <a:srgbClr val="FFFFFF"/>
+                </a:solidFill>
+              </a:rPr>
+            </a:br>
+            <a:r>
+              <a:rPr lang="en-GB" sz="13800" b="1" dirty="0">
+                <a:solidFill>
+                  <a:srgbClr val="FFFFFF"/>
+                </a:solidFill>
+              </a:rPr>
+              <a:t>halting problem</a:t>
+            </a:r>
+            <a:endParaRPr lang="en-GB" sz="16700" b="1" dirty="0">
+              <a:solidFill>
+                <a:srgbClr val="FFFFFF"/>
+              </a:solidFill>
+            </a:endParaRPr>
+          </a:p>
+        </p:txBody>
+      </p:sp>
+    </p:spTree>
+    <p:extLst>
+      <p:ext uri="{BB962C8B-B14F-4D97-AF65-F5344CB8AC3E}">
+        <p14:creationId xmlns:p14="http://schemas.microsoft.com/office/powerpoint/2010/main" val="3400449289"/>
       </p:ext>
     </p:extLst>
   </p:cSld>

</xml_diff>